<commit_message>
melhorando o banner. obs: falta o vídeo da aplicação
</commit_message>
<xml_diff>
--- a/docs/Banner.pptx
+++ b/docs/Banner.pptx
@@ -232,12 +232,12 @@
   <pc:docChgLst>
     <pc:chgData name="Gabriel Souza" userId="3aec459d9ad26342" providerId="LiveId" clId="{81108645-B148-42B2-9650-2E0488FE199C}"/>
     <pc:docChg chg="undo custSel modSld">
-      <pc:chgData name="Gabriel Souza" userId="3aec459d9ad26342" providerId="LiveId" clId="{81108645-B148-42B2-9650-2E0488FE199C}" dt="2025-11-13T23:46:28.339" v="285" actId="1076"/>
+      <pc:chgData name="Gabriel Souza" userId="3aec459d9ad26342" providerId="LiveId" clId="{81108645-B148-42B2-9650-2E0488FE199C}" dt="2025-11-15T13:10:37.767" v="431" actId="20577"/>
       <pc:docMkLst>
         <pc:docMk/>
       </pc:docMkLst>
       <pc:sldChg chg="addSp delSp modSp mod">
-        <pc:chgData name="Gabriel Souza" userId="3aec459d9ad26342" providerId="LiveId" clId="{81108645-B148-42B2-9650-2E0488FE199C}" dt="2025-11-13T23:46:28.339" v="285" actId="1076"/>
+        <pc:chgData name="Gabriel Souza" userId="3aec459d9ad26342" providerId="LiveId" clId="{81108645-B148-42B2-9650-2E0488FE199C}" dt="2025-11-15T13:10:37.767" v="431" actId="20577"/>
         <pc:sldMkLst>
           <pc:docMk/>
           <pc:sldMk cId="0" sldId="257"/>
@@ -251,7 +251,7 @@
           </ac:spMkLst>
         </pc:spChg>
         <pc:spChg chg="mod">
-          <ac:chgData name="Gabriel Souza" userId="3aec459d9ad26342" providerId="LiveId" clId="{81108645-B148-42B2-9650-2E0488FE199C}" dt="2025-11-13T23:45:08.059" v="270" actId="12"/>
+          <ac:chgData name="Gabriel Souza" userId="3aec459d9ad26342" providerId="LiveId" clId="{81108645-B148-42B2-9650-2E0488FE199C}" dt="2025-11-15T13:10:37.767" v="431" actId="20577"/>
           <ac:spMkLst>
             <pc:docMk/>
             <pc:sldMk cId="0" sldId="257"/>
@@ -259,7 +259,7 @@
           </ac:spMkLst>
         </pc:spChg>
         <pc:spChg chg="mod">
-          <ac:chgData name="Gabriel Souza" userId="3aec459d9ad26342" providerId="LiveId" clId="{81108645-B148-42B2-9650-2E0488FE199C}" dt="2025-11-13T23:46:18.698" v="284" actId="20577"/>
+          <ac:chgData name="Gabriel Souza" userId="3aec459d9ad26342" providerId="LiveId" clId="{81108645-B148-42B2-9650-2E0488FE199C}" dt="2025-11-15T13:01:02.568" v="296" actId="313"/>
           <ac:spMkLst>
             <pc:docMk/>
             <pc:sldMk cId="0" sldId="257"/>
@@ -267,7 +267,7 @@
           </ac:spMkLst>
         </pc:spChg>
         <pc:spChg chg="mod">
-          <ac:chgData name="Gabriel Souza" userId="3aec459d9ad26342" providerId="LiveId" clId="{81108645-B148-42B2-9650-2E0488FE199C}" dt="2025-11-13T23:46:28.339" v="285" actId="1076"/>
+          <ac:chgData name="Gabriel Souza" userId="3aec459d9ad26342" providerId="LiveId" clId="{81108645-B148-42B2-9650-2E0488FE199C}" dt="2025-11-15T13:01:26.659" v="298" actId="1076"/>
           <ac:spMkLst>
             <pc:docMk/>
             <pc:sldMk cId="0" sldId="257"/>
@@ -497,7 +497,7 @@
             <a:fld id="{B34088D9-6F99-4774-8F18-D88D64460132}" type="datetimeFigureOut">
               <a:rPr lang="pt-BR" smtClean="0"/>
               <a:pPr/>
-              <a:t>13/11/2025</a:t>
+              <a:t>15/11/2025</a:t>
             </a:fld>
             <a:endParaRPr lang="pt-BR"/>
           </a:p>
@@ -712,7 +712,7 @@
             <a:fld id="{B34088D9-6F99-4774-8F18-D88D64460132}" type="datetimeFigureOut">
               <a:rPr lang="pt-BR" smtClean="0"/>
               <a:pPr/>
-              <a:t>13/11/2025</a:t>
+              <a:t>15/11/2025</a:t>
             </a:fld>
             <a:endParaRPr lang="pt-BR"/>
           </a:p>
@@ -1261,7 +1261,7 @@
                 <a:latin typeface="Arial" panose="020B0604020202020204" pitchFamily="34" charset="0"/>
                 <a:cs typeface="Arial" panose="020B0604020202020204" pitchFamily="34" charset="0"/>
               </a:rPr>
-              <a:t>  Simulador 2D (pygame) de um cruzamento controlado por lógica Fuzzy. O sistema usa variáveis linguísticas (fluxo de carros, fluxo de pedestres, horário e clima) para recompor dinamicamente o tempo do verde do semáforo. A base de regras Fuzzy avalia padrões do ambiente e recomenda tempo de semáforo; o estado e decisões são exibidos na HUD e logs de ativação são impressos para análise.</a:t>
+              <a:t>  Simulador 2D (pygame) de um cruzamento controlado por lógica Fuzzy. O sistema usa variáveis linguísticas (fluxo de carros, fluxo de pedestres, horário e clima) para recompor dinamicamente o tempo do verde do semáforo. A base de regras Fuzzy avalia padrões do ambiente e recomenda tempo de semáforo; o estado e decisões são exibidos na HUD da aplicação e logs de ativação são impressos para análise.</a:t>
             </a:r>
           </a:p>
           <a:p>
@@ -1339,6 +1339,20 @@
                 <a:spcPts val="0"/>
               </a:spcBef>
             </a:pPr>
+            <a:endParaRPr lang="pt-BR" sz="3200" dirty="0">
+              <a:solidFill>
+                <a:schemeClr val="tx1"/>
+              </a:solidFill>
+              <a:latin typeface="Arial" panose="020B0604020202020204" pitchFamily="34" charset="0"/>
+              <a:cs typeface="Arial" panose="020B0604020202020204" pitchFamily="34" charset="0"/>
+            </a:endParaRPr>
+          </a:p>
+          <a:p>
+            <a:pPr algn="just">
+              <a:spcBef>
+                <a:spcPts val="0"/>
+              </a:spcBef>
+            </a:pPr>
             <a:r>
               <a:rPr lang="pt-BR" sz="6600" b="1" dirty="0">
                 <a:solidFill>
@@ -1380,18 +1394,36 @@
                 <a:latin typeface="Arial" panose="020B0604020202020204" pitchFamily="34" charset="0"/>
                 <a:cs typeface="Arial" panose="020B0604020202020204" pitchFamily="34" charset="0"/>
               </a:rPr>
-              <a:t>   Fuzzificação: funções de pertinência (</a:t>
-            </a:r>
-            <a:r>
-              <a:rPr lang="pt-BR" sz="3200" dirty="0" err="1">
+              <a:t>   Fuzzificação: funções de pertinência (trimf) para fluxo de carros, fluxo de pedestres, horário e clima; rótulos mapeados para valores numéricos no universo.</a:t>
+            </a:r>
+          </a:p>
+          <a:p>
+            <a:pPr marL="457200" indent="-457200" algn="just">
+              <a:spcBef>
+                <a:spcPts val="0"/>
+              </a:spcBef>
+              <a:buFont typeface="Arial" panose="020B0604020202020204" pitchFamily="34" charset="0"/>
+              <a:buChar char="•"/>
+            </a:pPr>
+            <a:r>
+              <a:rPr lang="pt-BR" sz="3200" dirty="0">
                 <a:solidFill>
                   <a:schemeClr val="tx1"/>
                 </a:solidFill>
                 <a:latin typeface="Arial" panose="020B0604020202020204" pitchFamily="34" charset="0"/>
                 <a:cs typeface="Arial" panose="020B0604020202020204" pitchFamily="34" charset="0"/>
               </a:rPr>
-              <a:t>trimf</a:t>
-            </a:r>
+              <a:t>   Inferência: base Fuzzy com 9 regras implementadas via skfuzzy.ctrl.Rule; combinações AND/OR avaliadas por min/max.</a:t>
+            </a:r>
+          </a:p>
+          <a:p>
+            <a:pPr marL="457200" indent="-457200" algn="just">
+              <a:spcBef>
+                <a:spcPts val="0"/>
+              </a:spcBef>
+              <a:buFont typeface="Arial" panose="020B0604020202020204" pitchFamily="34" charset="0"/>
+              <a:buChar char="•"/>
+            </a:pPr>
             <a:r>
               <a:rPr lang="pt-BR" sz="3200" dirty="0">
                 <a:solidFill>
@@ -1400,7 +1432,7 @@
                 <a:latin typeface="Arial" panose="020B0604020202020204" pitchFamily="34" charset="0"/>
                 <a:cs typeface="Arial" panose="020B0604020202020204" pitchFamily="34" charset="0"/>
               </a:rPr>
-              <a:t>) para fluxo de carros, fluxo de pedestres, horário e clima; rótulos mapeados para valores numéricos no universo.</a:t>
+              <a:t>   Defuzzificação: centroide (ControlSystemSimulation.compute()) para produzir o tempo recomendado do semáforo.</a:t>
             </a:r>
           </a:p>
           <a:p>
@@ -1419,205 +1451,34 @@
                 <a:latin typeface="Arial" panose="020B0604020202020204" pitchFamily="34" charset="0"/>
                 <a:cs typeface="Arial" panose="020B0604020202020204" pitchFamily="34" charset="0"/>
               </a:rPr>
-              <a:t>Inferência: base </a:t>
-            </a:r>
-            <a:r>
-              <a:rPr lang="pt-BR" sz="3200" dirty="0" err="1">
+              <a:t>   Heurística adicional: cálculo de prioridade (score 0-10) para compatibilidade.</a:t>
+            </a:r>
+          </a:p>
+          <a:p>
+            <a:pPr marL="457200" indent="-457200" algn="just">
+              <a:spcBef>
+                <a:spcPts val="0"/>
+              </a:spcBef>
+              <a:buFont typeface="Arial" panose="020B0604020202020204" pitchFamily="34" charset="0"/>
+              <a:buChar char="•"/>
+            </a:pPr>
+            <a:r>
+              <a:rPr lang="pt-BR" sz="3200" dirty="0">
                 <a:solidFill>
                   <a:schemeClr val="tx1"/>
                 </a:solidFill>
                 <a:latin typeface="Arial" panose="020B0604020202020204" pitchFamily="34" charset="0"/>
                 <a:cs typeface="Arial" panose="020B0604020202020204" pitchFamily="34" charset="0"/>
               </a:rPr>
-              <a:t>fuzzy</a:t>
-            </a:r>
-            <a:r>
-              <a:rPr lang="pt-BR" sz="3200" dirty="0">
-                <a:solidFill>
-                  <a:schemeClr val="tx1"/>
-                </a:solidFill>
-                <a:latin typeface="Arial" panose="020B0604020202020204" pitchFamily="34" charset="0"/>
-                <a:cs typeface="Arial" panose="020B0604020202020204" pitchFamily="34" charset="0"/>
-              </a:rPr>
-              <a:t> com 9 regras implementadas via </a:t>
-            </a:r>
-            <a:r>
-              <a:rPr lang="pt-BR" sz="3200" dirty="0" err="1">
-                <a:solidFill>
-                  <a:schemeClr val="tx1"/>
-                </a:solidFill>
-                <a:latin typeface="Arial" panose="020B0604020202020204" pitchFamily="34" charset="0"/>
-                <a:cs typeface="Arial" panose="020B0604020202020204" pitchFamily="34" charset="0"/>
-              </a:rPr>
-              <a:t>skfuzzy.ctrl.Rule</a:t>
-            </a:r>
-            <a:r>
-              <a:rPr lang="pt-BR" sz="3200" dirty="0">
-                <a:solidFill>
-                  <a:schemeClr val="tx1"/>
-                </a:solidFill>
-                <a:latin typeface="Arial" panose="020B0604020202020204" pitchFamily="34" charset="0"/>
-                <a:cs typeface="Arial" panose="020B0604020202020204" pitchFamily="34" charset="0"/>
-              </a:rPr>
-              <a:t>; combinações AND/OR avaliadas por min/</a:t>
-            </a:r>
-            <a:r>
-              <a:rPr lang="pt-BR" sz="3200" dirty="0" err="1">
-                <a:solidFill>
-                  <a:schemeClr val="tx1"/>
-                </a:solidFill>
-                <a:latin typeface="Arial" panose="020B0604020202020204" pitchFamily="34" charset="0"/>
-                <a:cs typeface="Arial" panose="020B0604020202020204" pitchFamily="34" charset="0"/>
-              </a:rPr>
-              <a:t>max</a:t>
-            </a:r>
-            <a:r>
-              <a:rPr lang="pt-BR" sz="3200" dirty="0">
-                <a:solidFill>
-                  <a:schemeClr val="tx1"/>
-                </a:solidFill>
-                <a:latin typeface="Arial" panose="020B0604020202020204" pitchFamily="34" charset="0"/>
-                <a:cs typeface="Arial" panose="020B0604020202020204" pitchFamily="34" charset="0"/>
-              </a:rPr>
-              <a:t>.</a:t>
-            </a:r>
-          </a:p>
-          <a:p>
-            <a:pPr marL="457200" indent="-457200" algn="just">
-              <a:spcBef>
-                <a:spcPts val="0"/>
-              </a:spcBef>
-              <a:buFont typeface="Arial" panose="020B0604020202020204" pitchFamily="34" charset="0"/>
-              <a:buChar char="•"/>
-            </a:pPr>
-            <a:r>
-              <a:rPr lang="pt-BR" sz="3200" dirty="0">
-                <a:solidFill>
-                  <a:schemeClr val="tx1"/>
-                </a:solidFill>
-                <a:latin typeface="Arial" panose="020B0604020202020204" pitchFamily="34" charset="0"/>
-                <a:cs typeface="Arial" panose="020B0604020202020204" pitchFamily="34" charset="0"/>
-              </a:rPr>
-              <a:t>Defuzzificação: </a:t>
-            </a:r>
-            <a:r>
-              <a:rPr lang="pt-BR" sz="3200" dirty="0" err="1">
-                <a:solidFill>
-                  <a:schemeClr val="tx1"/>
-                </a:solidFill>
-                <a:latin typeface="Arial" panose="020B0604020202020204" pitchFamily="34" charset="0"/>
-                <a:cs typeface="Arial" panose="020B0604020202020204" pitchFamily="34" charset="0"/>
-              </a:rPr>
-              <a:t>centróide</a:t>
-            </a:r>
-            <a:r>
-              <a:rPr lang="pt-BR" sz="3200" dirty="0">
-                <a:solidFill>
-                  <a:schemeClr val="tx1"/>
-                </a:solidFill>
-                <a:latin typeface="Arial" panose="020B0604020202020204" pitchFamily="34" charset="0"/>
-                <a:cs typeface="Arial" panose="020B0604020202020204" pitchFamily="34" charset="0"/>
-              </a:rPr>
-              <a:t> (</a:t>
-            </a:r>
-            <a:r>
-              <a:rPr lang="pt-BR" sz="3200" dirty="0" err="1">
-                <a:solidFill>
-                  <a:schemeClr val="tx1"/>
-                </a:solidFill>
-                <a:latin typeface="Arial" panose="020B0604020202020204" pitchFamily="34" charset="0"/>
-                <a:cs typeface="Arial" panose="020B0604020202020204" pitchFamily="34" charset="0"/>
-              </a:rPr>
-              <a:t>ControlSystemSimulation.compute</a:t>
-            </a:r>
-            <a:r>
-              <a:rPr lang="pt-BR" sz="3200" dirty="0">
-                <a:solidFill>
-                  <a:schemeClr val="tx1"/>
-                </a:solidFill>
-                <a:latin typeface="Arial" panose="020B0604020202020204" pitchFamily="34" charset="0"/>
-                <a:cs typeface="Arial" panose="020B0604020202020204" pitchFamily="34" charset="0"/>
-              </a:rPr>
-              <a:t>()) para produzir o tempo recomendado do semáforo.</a:t>
-            </a:r>
-          </a:p>
-          <a:p>
-            <a:pPr marL="457200" indent="-457200" algn="just">
-              <a:spcBef>
-                <a:spcPts val="0"/>
-              </a:spcBef>
-              <a:buFont typeface="Arial" panose="020B0604020202020204" pitchFamily="34" charset="0"/>
-              <a:buChar char="•"/>
-            </a:pPr>
-            <a:r>
-              <a:rPr lang="pt-BR" sz="3200" dirty="0">
-                <a:solidFill>
-                  <a:schemeClr val="tx1"/>
-                </a:solidFill>
-                <a:latin typeface="Arial" panose="020B0604020202020204" pitchFamily="34" charset="0"/>
-                <a:cs typeface="Arial" panose="020B0604020202020204" pitchFamily="34" charset="0"/>
-              </a:rPr>
-              <a:t>Heurística adicional: cálculo de prioridade (score 0–10) para compatibilidade.</a:t>
-            </a:r>
-          </a:p>
-          <a:p>
-            <a:pPr marL="457200" indent="-457200" algn="just">
-              <a:spcBef>
-                <a:spcPts val="0"/>
-              </a:spcBef>
-              <a:buFont typeface="Arial" panose="020B0604020202020204" pitchFamily="34" charset="0"/>
-              <a:buChar char="•"/>
-            </a:pPr>
-            <a:r>
-              <a:rPr lang="pt-BR" sz="3200" dirty="0">
-                <a:solidFill>
-                  <a:schemeClr val="tx1"/>
-                </a:solidFill>
-                <a:latin typeface="Arial" panose="020B0604020202020204" pitchFamily="34" charset="0"/>
-                <a:cs typeface="Arial" panose="020B0604020202020204" pitchFamily="34" charset="0"/>
-              </a:rPr>
-              <a:t>Diagnóstico: </a:t>
-            </a:r>
-            <a:r>
-              <a:rPr lang="pt-BR" sz="3200" dirty="0" err="1">
-                <a:solidFill>
-                  <a:schemeClr val="tx1"/>
-                </a:solidFill>
-                <a:latin typeface="Arial" panose="020B0604020202020204" pitchFamily="34" charset="0"/>
-                <a:cs typeface="Arial" panose="020B0604020202020204" pitchFamily="34" charset="0"/>
-              </a:rPr>
-              <a:t>interp_membership</a:t>
-            </a:r>
-            <a:r>
-              <a:rPr lang="pt-BR" sz="3200" dirty="0">
-                <a:solidFill>
-                  <a:schemeClr val="tx1"/>
-                </a:solidFill>
-                <a:latin typeface="Arial" panose="020B0604020202020204" pitchFamily="34" charset="0"/>
-                <a:cs typeface="Arial" panose="020B0604020202020204" pitchFamily="34" charset="0"/>
-              </a:rPr>
-              <a:t> + </a:t>
-            </a:r>
-            <a:r>
-              <a:rPr lang="pt-BR" sz="3200" dirty="0" err="1">
-                <a:solidFill>
-                  <a:schemeClr val="tx1"/>
-                </a:solidFill>
-                <a:latin typeface="Arial" panose="020B0604020202020204" pitchFamily="34" charset="0"/>
-                <a:cs typeface="Arial" panose="020B0604020202020204" pitchFamily="34" charset="0"/>
-              </a:rPr>
-              <a:t>evaluate_rules</a:t>
-            </a:r>
-            <a:r>
-              <a:rPr lang="pt-BR" sz="3200" dirty="0">
-                <a:solidFill>
-                  <a:schemeClr val="tx1"/>
-                </a:solidFill>
-                <a:latin typeface="Arial" panose="020B0604020202020204" pitchFamily="34" charset="0"/>
-                <a:cs typeface="Arial" panose="020B0604020202020204" pitchFamily="34" charset="0"/>
-              </a:rPr>
-              <a:t> para obter graus de ativação e logs.</a:t>
-            </a:r>
+              <a:t>   Diagnóstico: avaliar_regras para obter graus de ativação e logs.</a:t>
+            </a:r>
+          </a:p>
+          <a:p>
+            <a:pPr algn="just">
+              <a:spcBef>
+                <a:spcPts val="0"/>
+              </a:spcBef>
+            </a:pPr>
             <a:endParaRPr lang="pt-BR" sz="2800" dirty="0">
               <a:solidFill>
                 <a:schemeClr val="tx1"/>
@@ -1671,108 +1532,70 @@
                 <a:latin typeface="Arial" panose="020B0604020202020204" pitchFamily="34" charset="0"/>
                 <a:cs typeface="Arial" panose="020B0604020202020204" pitchFamily="34" charset="0"/>
               </a:rPr>
-              <a:t>   Implementada </a:t>
-            </a:r>
-            <a:r>
-              <a:rPr lang="pt-BR" sz="3200" dirty="0" err="1">
+              <a:t>   Implementada Fuzzificação (trimf), base de regras (9 regras conforme especificado) e Defuzzificação por centroide. O sistema ajusta tempo do verde em tempo real, imprime regras ativadas com graus, reseta cenário ao alterar ambiente e exibe tempo recomendado na HUD. Observou-se comportamento mais adaptativo a picos e chuva, com trocas mais coerentes que a heurística pura (sistema de controle de tráfego que existia antes da implementação da Lógica Fuzzy).</a:t>
+            </a:r>
+          </a:p>
+          <a:p>
+            <a:pPr algn="just">
+              <a:spcBef>
+                <a:spcPts val="0"/>
+              </a:spcBef>
+            </a:pPr>
+            <a:endParaRPr lang="pt-BR" sz="3200" dirty="0">
+              <a:solidFill>
+                <a:schemeClr val="tx1"/>
+              </a:solidFill>
+              <a:latin typeface="Arial" panose="020B0604020202020204" pitchFamily="34" charset="0"/>
+              <a:cs typeface="Arial" panose="020B0604020202020204" pitchFamily="34" charset="0"/>
+            </a:endParaRPr>
+          </a:p>
+          <a:p>
+            <a:pPr algn="just">
+              <a:spcBef>
+                <a:spcPts val="0"/>
+              </a:spcBef>
+            </a:pPr>
+            <a:r>
+              <a:rPr lang="pt-BR" sz="6600" b="1" dirty="0">
                 <a:solidFill>
                   <a:schemeClr val="tx1"/>
                 </a:solidFill>
                 <a:latin typeface="Arial" panose="020B0604020202020204" pitchFamily="34" charset="0"/>
                 <a:cs typeface="Arial" panose="020B0604020202020204" pitchFamily="34" charset="0"/>
               </a:rPr>
-              <a:t>fuzzificação</a:t>
-            </a:r>
-            <a:r>
-              <a:rPr lang="pt-BR" sz="3200" dirty="0">
+              <a:t>VÍDEO DA APLICAÇÃO</a:t>
+            </a:r>
+          </a:p>
+          <a:p>
+            <a:pPr algn="just">
+              <a:spcBef>
+                <a:spcPts val="0"/>
+              </a:spcBef>
+            </a:pPr>
+            <a:r>
+              <a:rPr lang="pt-BR" sz="6600" b="1" dirty="0">
                 <a:solidFill>
                   <a:schemeClr val="tx1"/>
                 </a:solidFill>
                 <a:latin typeface="Arial" panose="020B0604020202020204" pitchFamily="34" charset="0"/>
                 <a:cs typeface="Arial" panose="020B0604020202020204" pitchFamily="34" charset="0"/>
               </a:rPr>
-              <a:t> (</a:t>
-            </a:r>
-            <a:r>
-              <a:rPr lang="pt-BR" sz="3200" dirty="0" err="1">
-                <a:solidFill>
-                  <a:schemeClr val="tx1"/>
-                </a:solidFill>
-                <a:latin typeface="Arial" panose="020B0604020202020204" pitchFamily="34" charset="0"/>
-                <a:cs typeface="Arial" panose="020B0604020202020204" pitchFamily="34" charset="0"/>
-              </a:rPr>
-              <a:t>MFs</a:t>
-            </a:r>
-            <a:r>
-              <a:rPr lang="pt-BR" sz="3200" dirty="0">
-                <a:solidFill>
-                  <a:schemeClr val="tx1"/>
-                </a:solidFill>
-                <a:latin typeface="Arial" panose="020B0604020202020204" pitchFamily="34" charset="0"/>
-                <a:cs typeface="Arial" panose="020B0604020202020204" pitchFamily="34" charset="0"/>
-              </a:rPr>
               <a:t> </a:t>
             </a:r>
-            <a:r>
-              <a:rPr lang="pt-BR" sz="3200" dirty="0" err="1">
-                <a:solidFill>
-                  <a:schemeClr val="tx1"/>
-                </a:solidFill>
-                <a:latin typeface="Arial" panose="020B0604020202020204" pitchFamily="34" charset="0"/>
-                <a:cs typeface="Arial" panose="020B0604020202020204" pitchFamily="34" charset="0"/>
-              </a:rPr>
-              <a:t>trimf</a:t>
-            </a:r>
-            <a:r>
-              <a:rPr lang="pt-BR" sz="3200" dirty="0">
-                <a:solidFill>
-                  <a:schemeClr val="tx1"/>
-                </a:solidFill>
-                <a:latin typeface="Arial" panose="020B0604020202020204" pitchFamily="34" charset="0"/>
-                <a:cs typeface="Arial" panose="020B0604020202020204" pitchFamily="34" charset="0"/>
-              </a:rPr>
-              <a:t>), base de regras (9 regras conforme especificado) e </a:t>
-            </a:r>
-            <a:r>
-              <a:rPr lang="pt-BR" sz="3200" dirty="0" err="1">
-                <a:solidFill>
-                  <a:schemeClr val="tx1"/>
-                </a:solidFill>
-                <a:latin typeface="Arial" panose="020B0604020202020204" pitchFamily="34" charset="0"/>
-                <a:cs typeface="Arial" panose="020B0604020202020204" pitchFamily="34" charset="0"/>
-              </a:rPr>
-              <a:t>defuzzificação</a:t>
-            </a:r>
-            <a:r>
-              <a:rPr lang="pt-BR" sz="3200" dirty="0">
-                <a:solidFill>
-                  <a:schemeClr val="tx1"/>
-                </a:solidFill>
-                <a:latin typeface="Arial" panose="020B0604020202020204" pitchFamily="34" charset="0"/>
-                <a:cs typeface="Arial" panose="020B0604020202020204" pitchFamily="34" charset="0"/>
-              </a:rPr>
-              <a:t> por </a:t>
-            </a:r>
-            <a:r>
-              <a:rPr lang="pt-BR" sz="3200" dirty="0" err="1">
-                <a:solidFill>
-                  <a:schemeClr val="tx1"/>
-                </a:solidFill>
-                <a:latin typeface="Arial" panose="020B0604020202020204" pitchFamily="34" charset="0"/>
-                <a:cs typeface="Arial" panose="020B0604020202020204" pitchFamily="34" charset="0"/>
-              </a:rPr>
-              <a:t>centróide</a:t>
-            </a:r>
-            <a:r>
-              <a:rPr lang="pt-BR" sz="3200" dirty="0">
-                <a:solidFill>
-                  <a:schemeClr val="tx1"/>
-                </a:solidFill>
-                <a:latin typeface="Arial" panose="020B0604020202020204" pitchFamily="34" charset="0"/>
-                <a:cs typeface="Arial" panose="020B0604020202020204" pitchFamily="34" charset="0"/>
-              </a:rPr>
-              <a:t>. O sistema ajusta tempo do verde em tempo real, imprime regras ativadas com graus, reseta cenário ao alterar ambiente e exibe tempo recomendado na HUD. Observou-se comportamento mais adaptativo a picos e chuva, com trocas mais coerentes que a heurística pura.</a:t>
-            </a:r>
+          </a:p>
+          <a:p>
+            <a:pPr algn="just">
+              <a:spcBef>
+                <a:spcPts val="0"/>
+              </a:spcBef>
+            </a:pPr>
+            <a:endParaRPr lang="pt-BR" sz="3200" dirty="0">
+              <a:solidFill>
+                <a:schemeClr val="tx1"/>
+              </a:solidFill>
+              <a:latin typeface="Arial" panose="020B0604020202020204" pitchFamily="34" charset="0"/>
+              <a:cs typeface="Arial" panose="020B0604020202020204" pitchFamily="34" charset="0"/>
+            </a:endParaRPr>
           </a:p>
         </p:txBody>
       </p:sp>
@@ -2085,35 +1908,7 @@
                 <a:latin typeface="Arial" panose="020B0604020202020204" pitchFamily="34" charset="0"/>
                 <a:cs typeface="Arial" panose="020B0604020202020204" pitchFamily="34" charset="0"/>
               </a:rPr>
-              <a:t>    A aplicação mostrou que o controlador </a:t>
-            </a:r>
-            <a:r>
-              <a:rPr lang="pt-BR" sz="3200" dirty="0" err="1">
-                <a:latin typeface="Arial" panose="020B0604020202020204" pitchFamily="34" charset="0"/>
-                <a:cs typeface="Arial" panose="020B0604020202020204" pitchFamily="34" charset="0"/>
-              </a:rPr>
-              <a:t>fuzzy</a:t>
-            </a:r>
-            <a:r>
-              <a:rPr lang="pt-BR" sz="3200" dirty="0">
-                <a:latin typeface="Arial" panose="020B0604020202020204" pitchFamily="34" charset="0"/>
-                <a:cs typeface="Arial" panose="020B0604020202020204" pitchFamily="34" charset="0"/>
-              </a:rPr>
-              <a:t> adapta o tempo verde às        condições ambientais: tempos maiores em horários de pico e chuva, menores com fluxo/pedestres baixos. As impressões das regras e seus graus confirmam decisões graduais e interpretáveis. Nos testes, a lógica </a:t>
-            </a:r>
-            <a:r>
-              <a:rPr lang="pt-BR" sz="3200" dirty="0" err="1">
-                <a:latin typeface="Arial" panose="020B0604020202020204" pitchFamily="34" charset="0"/>
-                <a:cs typeface="Arial" panose="020B0604020202020204" pitchFamily="34" charset="0"/>
-              </a:rPr>
-              <a:t>fuzzy</a:t>
-            </a:r>
-            <a:r>
-              <a:rPr lang="pt-BR" sz="3200" dirty="0">
-                <a:latin typeface="Arial" panose="020B0604020202020204" pitchFamily="34" charset="0"/>
-                <a:cs typeface="Arial" panose="020B0604020202020204" pitchFamily="34" charset="0"/>
-              </a:rPr>
-              <a:t> comportou-se de forma consistente e eficaz para ajustar dinamicamente o semáforo.</a:t>
+              <a:t>    A aplicação mostrou que o controlador Fuzzy adapta o tempo verde às        condições ambientais: tempos maiores em horários de pico e chuva, menores com fluxo/pedestres baixos. As impressões das regras e seus graus confirmam decisões graduais e interpretáveis. Nos testes, a lógica Fuzzy comportou-se de forma consistente e eficaz para ajustar dinamicamente o semáforo.</a:t>
             </a:r>
           </a:p>
         </p:txBody>
@@ -2254,7 +2049,7 @@
         </p:nvSpPr>
         <p:spPr>
           <a:xfrm>
-            <a:off x="696254" y="36499706"/>
+            <a:off x="696254" y="36609241"/>
             <a:ext cx="30749932" cy="5903380"/>
           </a:xfrm>
           <a:prstGeom prst="rect">

</xml_diff>

<commit_message>
add o vídeo da aplicação e ajustando Banner
</commit_message>
<xml_diff>
--- a/docs/Banner.pptx
+++ b/docs/Banner.pptx
@@ -232,12 +232,12 @@
   <pc:docChgLst>
     <pc:chgData name="Gabriel Souza" userId="3aec459d9ad26342" providerId="LiveId" clId="{81108645-B148-42B2-9650-2E0488FE199C}"/>
     <pc:docChg chg="undo custSel modSld">
-      <pc:chgData name="Gabriel Souza" userId="3aec459d9ad26342" providerId="LiveId" clId="{81108645-B148-42B2-9650-2E0488FE199C}" dt="2025-11-15T13:10:37.767" v="431" actId="20577"/>
+      <pc:chgData name="Gabriel Souza" userId="3aec459d9ad26342" providerId="LiveId" clId="{81108645-B148-42B2-9650-2E0488FE199C}" dt="2025-11-18T18:24:14.666" v="472" actId="1076"/>
       <pc:docMkLst>
         <pc:docMk/>
       </pc:docMkLst>
       <pc:sldChg chg="addSp delSp modSp mod">
-        <pc:chgData name="Gabriel Souza" userId="3aec459d9ad26342" providerId="LiveId" clId="{81108645-B148-42B2-9650-2E0488FE199C}" dt="2025-11-15T13:10:37.767" v="431" actId="20577"/>
+        <pc:chgData name="Gabriel Souza" userId="3aec459d9ad26342" providerId="LiveId" clId="{81108645-B148-42B2-9650-2E0488FE199C}" dt="2025-11-18T18:24:14.666" v="472" actId="1076"/>
         <pc:sldMkLst>
           <pc:docMk/>
           <pc:sldMk cId="0" sldId="257"/>
@@ -251,7 +251,7 @@
           </ac:spMkLst>
         </pc:spChg>
         <pc:spChg chg="mod">
-          <ac:chgData name="Gabriel Souza" userId="3aec459d9ad26342" providerId="LiveId" clId="{81108645-B148-42B2-9650-2E0488FE199C}" dt="2025-11-15T13:10:37.767" v="431" actId="20577"/>
+          <ac:chgData name="Gabriel Souza" userId="3aec459d9ad26342" providerId="LiveId" clId="{81108645-B148-42B2-9650-2E0488FE199C}" dt="2025-11-18T18:24:11.855" v="471" actId="20577"/>
           <ac:spMkLst>
             <pc:docMk/>
             <pc:sldMk cId="0" sldId="257"/>
@@ -296,6 +296,14 @@
             <pc:docMk/>
             <pc:sldMk cId="0" sldId="257"/>
             <ac:picMk id="10" creationId="{0965D759-C48D-4FB7-95A4-FA144F2E93F1}"/>
+          </ac:picMkLst>
+        </pc:picChg>
+        <pc:picChg chg="add mod">
+          <ac:chgData name="Gabriel Souza" userId="3aec459d9ad26342" providerId="LiveId" clId="{81108645-B148-42B2-9650-2E0488FE199C}" dt="2025-11-18T18:24:14.666" v="472" actId="1076"/>
+          <ac:picMkLst>
+            <pc:docMk/>
+            <pc:sldMk cId="0" sldId="257"/>
+            <ac:picMk id="10" creationId="{4588763E-3995-49A8-AB35-37DF4E5044CE}"/>
           </ac:picMkLst>
         </pc:picChg>
         <pc:picChg chg="del">
@@ -497,7 +505,7 @@
             <a:fld id="{B34088D9-6F99-4774-8F18-D88D64460132}" type="datetimeFigureOut">
               <a:rPr lang="pt-BR" smtClean="0"/>
               <a:pPr/>
-              <a:t>15/11/2025</a:t>
+              <a:t>18/11/2025</a:t>
             </a:fld>
             <a:endParaRPr lang="pt-BR"/>
           </a:p>
@@ -712,7 +720,7 @@
             <a:fld id="{B34088D9-6F99-4774-8F18-D88D64460132}" type="datetimeFigureOut">
               <a:rPr lang="pt-BR" smtClean="0"/>
               <a:pPr/>
-              <a:t>15/11/2025</a:t>
+              <a:t>18/11/2025</a:t>
             </a:fld>
             <a:endParaRPr lang="pt-BR"/>
           </a:p>
@@ -1572,16 +1580,56 @@
                 <a:spcPts val="0"/>
               </a:spcBef>
             </a:pPr>
-            <a:r>
-              <a:rPr lang="pt-BR" sz="6600" b="1" dirty="0">
+            <a:endParaRPr lang="pt-BR" sz="3200" b="1" dirty="0">
+              <a:solidFill>
+                <a:schemeClr val="tx1"/>
+              </a:solidFill>
+              <a:latin typeface="Arial" panose="020B0604020202020204" pitchFamily="34" charset="0"/>
+              <a:cs typeface="Arial" panose="020B0604020202020204" pitchFamily="34" charset="0"/>
+            </a:endParaRPr>
+          </a:p>
+          <a:p>
+            <a:pPr algn="just">
+              <a:spcBef>
+                <a:spcPts val="0"/>
+              </a:spcBef>
+            </a:pPr>
+            <a:r>
+              <a:rPr lang="pt-BR" sz="3600" dirty="0">
                 <a:solidFill>
                   <a:schemeClr val="tx1"/>
                 </a:solidFill>
                 <a:latin typeface="Arial" panose="020B0604020202020204" pitchFamily="34" charset="0"/>
                 <a:cs typeface="Arial" panose="020B0604020202020204" pitchFamily="34" charset="0"/>
-              </a:rPr>
-              <a:t> </a:t>
-            </a:r>
+                <a:hlinkClick r:id="rId2"/>
+              </a:rPr>
+              <a:t>https://drive.google.com/drive/folders/12Jot-h3</a:t>
+            </a:r>
+          </a:p>
+          <a:p>
+            <a:pPr algn="just">
+              <a:spcBef>
+                <a:spcPts val="0"/>
+              </a:spcBef>
+            </a:pPr>
+            <a:r>
+              <a:rPr lang="pt-BR" sz="3600" dirty="0">
+                <a:solidFill>
+                  <a:schemeClr val="tx1"/>
+                </a:solidFill>
+                <a:latin typeface="Arial" panose="020B0604020202020204" pitchFamily="34" charset="0"/>
+                <a:cs typeface="Arial" panose="020B0604020202020204" pitchFamily="34" charset="0"/>
+                <a:hlinkClick r:id="rId2"/>
+              </a:rPr>
+              <a:t>SRH0EXn0CtwHxpU-zRgsph41X?usp=sharing</a:t>
+            </a:r>
+            <a:endParaRPr lang="pt-BR" sz="6600" dirty="0">
+              <a:solidFill>
+                <a:schemeClr val="tx1"/>
+              </a:solidFill>
+              <a:latin typeface="Arial" panose="020B0604020202020204" pitchFamily="34" charset="0"/>
+              <a:cs typeface="Arial" panose="020B0604020202020204" pitchFamily="34" charset="0"/>
+            </a:endParaRPr>
           </a:p>
           <a:p>
             <a:pPr algn="just">
@@ -2264,7 +2312,7 @@
                 <a:solidFill>
                   <a:schemeClr val="tx1"/>
                 </a:solidFill>
-                <a:hlinkClick r:id="rId2"/>
+                <a:hlinkClick r:id="rId3"/>
               </a:rPr>
               <a:t>https://repositorio.utfpr.edu.br/jspui/bitstream/1/30773/1/controleinteligentefuzzysemaforo.pdf</a:t>
             </a:r>
@@ -2307,7 +2355,7 @@
                 <a:solidFill>
                   <a:schemeClr val="tx1"/>
                 </a:solidFill>
-                <a:hlinkClick r:id="rId3"/>
+                <a:hlinkClick r:id="rId4"/>
               </a:rPr>
               <a:t>https://repositorio.ufsc.br/xmlui/bitstream/handle/123456789/82790/190526.pdf?sequence=1&amp;isAllowed=y</a:t>
             </a:r>
@@ -2354,7 +2402,7 @@
                 </a:solidFill>
                 <a:ea typeface="Calibri"/>
                 <a:cs typeface="Calibri"/>
-                <a:hlinkClick r:id="rId4"/>
+                <a:hlinkClick r:id="rId5"/>
               </a:rPr>
               <a:t>https://www.sba.org.br/open_journal_systems/index.php/sbai/article/view/2709/2249</a:t>
             </a:r>
@@ -2383,7 +2431,7 @@
           <p:nvPr/>
         </p:nvPicPr>
         <p:blipFill>
-          <a:blip r:embed="rId5"/>
+          <a:blip r:embed="rId6"/>
           <a:stretch>
             <a:fillRect/>
           </a:stretch>
@@ -2413,7 +2461,7 @@
           <p:nvPr/>
         </p:nvPicPr>
         <p:blipFill>
-          <a:blip r:embed="rId6"/>
+          <a:blip r:embed="rId7"/>
           <a:stretch>
             <a:fillRect/>
           </a:stretch>
@@ -2443,7 +2491,7 @@
           <p:nvPr/>
         </p:nvPicPr>
         <p:blipFill>
-          <a:blip r:embed="rId7"/>
+          <a:blip r:embed="rId8"/>
           <a:stretch>
             <a:fillRect/>
           </a:stretch>
@@ -2452,6 +2500,36 @@
           <a:xfrm>
             <a:off x="18434273" y="22375172"/>
             <a:ext cx="9721080" cy="10161280"/>
+          </a:xfrm>
+          <a:prstGeom prst="rect">
+            <a:avLst/>
+          </a:prstGeom>
+        </p:spPr>
+      </p:pic>
+      <p:pic>
+        <p:nvPicPr>
+          <p:cNvPr id="10" name="Imagem 9">
+            <a:extLst>
+              <a:ext uri="{FF2B5EF4-FFF2-40B4-BE49-F238E27FC236}">
+                <a16:creationId xmlns:a16="http://schemas.microsoft.com/office/drawing/2014/main" id="{4588763E-3995-49A8-AB35-37DF4E5044CE}"/>
+              </a:ext>
+            </a:extLst>
+          </p:cNvPr>
+          <p:cNvPicPr>
+            <a:picLocks noChangeAspect="1"/>
+          </p:cNvPicPr>
+          <p:nvPr/>
+        </p:nvPicPr>
+        <p:blipFill>
+          <a:blip r:embed="rId9"/>
+          <a:stretch>
+            <a:fillRect/>
+          </a:stretch>
+        </p:blipFill>
+        <p:spPr>
+          <a:xfrm>
+            <a:off x="12074520" y="32754048"/>
+            <a:ext cx="2514951" cy="3372321"/>
           </a:xfrm>
           <a:prstGeom prst="rect">
             <a:avLst/>

</xml_diff>

<commit_message>
subindo versão final do projeto
</commit_message>
<xml_diff>
--- a/docs/Banner.pptx
+++ b/docs/Banner.pptx
@@ -123,201 +123,12 @@
 </p:presentation>
 </file>
 
-<file path=ppt/changesInfos/changesInfo1.xml><?xml version="1.0" encoding="utf-8"?>
-<pc:chgInfo xmlns:a="http://schemas.openxmlformats.org/drawingml/2006/main" xmlns:r="http://schemas.openxmlformats.org/officeDocument/2006/relationships" xmlns:ac="http://schemas.microsoft.com/office/drawing/2013/main/command" xmlns:pc="http://schemas.microsoft.com/office/powerpoint/2013/main/command">
-  <pc:docChgLst>
-    <pc:chgData name="ADAILTON DE JESUS CERQUEIRA JUNIOR" userId="S::adailton.cerqueira@ulife.com.br::4fde272d-0841-4e9c-8bd1-5d76f6d1716c" providerId="AD" clId="Web-{04DFA0B4-13E0-F08D-1B1D-291B902E44C2}"/>
-    <pc:docChg chg="modSld">
-      <pc:chgData name="ADAILTON DE JESUS CERQUEIRA JUNIOR" userId="S::adailton.cerqueira@ulife.com.br::4fde272d-0841-4e9c-8bd1-5d76f6d1716c" providerId="AD" clId="Web-{04DFA0B4-13E0-F08D-1B1D-291B902E44C2}" dt="2025-09-26T00:55:24.553" v="243" actId="20577"/>
-      <pc:docMkLst>
-        <pc:docMk/>
-      </pc:docMkLst>
-      <pc:sldChg chg="addSp delSp modSp">
-        <pc:chgData name="ADAILTON DE JESUS CERQUEIRA JUNIOR" userId="S::adailton.cerqueira@ulife.com.br::4fde272d-0841-4e9c-8bd1-5d76f6d1716c" providerId="AD" clId="Web-{04DFA0B4-13E0-F08D-1B1D-291B902E44C2}" dt="2025-09-26T00:55:24.553" v="243" actId="20577"/>
-        <pc:sldMkLst>
-          <pc:docMk/>
-          <pc:sldMk cId="0" sldId="257"/>
-        </pc:sldMkLst>
-        <pc:spChg chg="mod">
-          <ac:chgData name="ADAILTON DE JESUS CERQUEIRA JUNIOR" userId="S::adailton.cerqueira@ulife.com.br::4fde272d-0841-4e9c-8bd1-5d76f6d1716c" providerId="AD" clId="Web-{04DFA0B4-13E0-F08D-1B1D-291B902E44C2}" dt="2025-09-26T00:55:24.553" v="243" actId="20577"/>
-          <ac:spMkLst>
-            <pc:docMk/>
-            <pc:sldMk cId="0" sldId="257"/>
-            <ac:spMk id="2" creationId="{00000000-0000-0000-0000-000000000000}"/>
-          </ac:spMkLst>
-        </pc:spChg>
-        <pc:spChg chg="mod">
-          <ac:chgData name="ADAILTON DE JESUS CERQUEIRA JUNIOR" userId="S::adailton.cerqueira@ulife.com.br::4fde272d-0841-4e9c-8bd1-5d76f6d1716c" providerId="AD" clId="Web-{04DFA0B4-13E0-F08D-1B1D-291B902E44C2}" dt="2025-09-26T00:47:39.551" v="74" actId="20577"/>
-          <ac:spMkLst>
-            <pc:docMk/>
-            <pc:sldMk cId="0" sldId="257"/>
-            <ac:spMk id="3" creationId="{00000000-0000-0000-0000-000000000000}"/>
-          </ac:spMkLst>
-        </pc:spChg>
-        <pc:spChg chg="mod">
-          <ac:chgData name="ADAILTON DE JESUS CERQUEIRA JUNIOR" userId="S::adailton.cerqueira@ulife.com.br::4fde272d-0841-4e9c-8bd1-5d76f6d1716c" providerId="AD" clId="Web-{04DFA0B4-13E0-F08D-1B1D-291B902E44C2}" dt="2025-09-26T00:53:14.295" v="231" actId="20577"/>
-          <ac:spMkLst>
-            <pc:docMk/>
-            <pc:sldMk cId="0" sldId="257"/>
-            <ac:spMk id="15" creationId="{00000000-0000-0000-0000-000000000000}"/>
-          </ac:spMkLst>
-        </pc:spChg>
-        <pc:spChg chg="mod">
-          <ac:chgData name="ADAILTON DE JESUS CERQUEIRA JUNIOR" userId="S::adailton.cerqueira@ulife.com.br::4fde272d-0841-4e9c-8bd1-5d76f6d1716c" providerId="AD" clId="Web-{04DFA0B4-13E0-F08D-1B1D-291B902E44C2}" dt="2025-09-26T00:48:03.584" v="78" actId="20577"/>
-          <ac:spMkLst>
-            <pc:docMk/>
-            <pc:sldMk cId="0" sldId="257"/>
-            <ac:spMk id="17" creationId="{00000000-0000-0000-0000-000000000000}"/>
-          </ac:spMkLst>
-        </pc:spChg>
-        <pc:graphicFrameChg chg="mod modGraphic">
-          <ac:chgData name="ADAILTON DE JESUS CERQUEIRA JUNIOR" userId="S::adailton.cerqueira@ulife.com.br::4fde272d-0841-4e9c-8bd1-5d76f6d1716c" providerId="AD" clId="Web-{04DFA0B4-13E0-F08D-1B1D-291B902E44C2}" dt="2025-09-26T00:51:33.832" v="200" actId="1076"/>
-          <ac:graphicFrameMkLst>
-            <pc:docMk/>
-            <pc:sldMk cId="0" sldId="257"/>
-            <ac:graphicFrameMk id="8" creationId="{00000000-0000-0000-0000-000000000000}"/>
-          </ac:graphicFrameMkLst>
-        </pc:graphicFrameChg>
-        <pc:graphicFrameChg chg="del">
-          <ac:chgData name="ADAILTON DE JESUS CERQUEIRA JUNIOR" userId="S::adailton.cerqueira@ulife.com.br::4fde272d-0841-4e9c-8bd1-5d76f6d1716c" providerId="AD" clId="Web-{04DFA0B4-13E0-F08D-1B1D-291B902E44C2}" dt="2025-09-26T00:48:25.008" v="81"/>
-          <ac:graphicFrameMkLst>
-            <pc:docMk/>
-            <pc:sldMk cId="0" sldId="257"/>
-            <ac:graphicFrameMk id="10" creationId="{00000000-0000-0000-0000-000000000000}"/>
-          </ac:graphicFrameMkLst>
-        </pc:graphicFrameChg>
-        <pc:picChg chg="add del mod">
-          <ac:chgData name="ADAILTON DE JESUS CERQUEIRA JUNIOR" userId="S::adailton.cerqueira@ulife.com.br::4fde272d-0841-4e9c-8bd1-5d76f6d1716c" providerId="AD" clId="Web-{04DFA0B4-13E0-F08D-1B1D-291B902E44C2}" dt="2025-09-26T00:31:41.045" v="9"/>
-          <ac:picMkLst>
-            <pc:docMk/>
-            <pc:sldMk cId="0" sldId="257"/>
-            <ac:picMk id="6" creationId="{2F7AA305-31C1-24B8-58D8-4A041008685B}"/>
-          </ac:picMkLst>
-        </pc:picChg>
-        <pc:picChg chg="add mod">
-          <ac:chgData name="ADAILTON DE JESUS CERQUEIRA JUNIOR" userId="S::adailton.cerqueira@ulife.com.br::4fde272d-0841-4e9c-8bd1-5d76f6d1716c" providerId="AD" clId="Web-{04DFA0B4-13E0-F08D-1B1D-291B902E44C2}" dt="2025-09-26T00:33:36.697" v="21" actId="1076"/>
-          <ac:picMkLst>
-            <pc:docMk/>
-            <pc:sldMk cId="0" sldId="257"/>
-            <ac:picMk id="7" creationId="{DE0425B4-4BBE-4119-F4E3-54908A697293}"/>
-          </ac:picMkLst>
-        </pc:picChg>
-        <pc:picChg chg="add mod">
-          <ac:chgData name="ADAILTON DE JESUS CERQUEIRA JUNIOR" userId="S::adailton.cerqueira@ulife.com.br::4fde272d-0841-4e9c-8bd1-5d76f6d1716c" providerId="AD" clId="Web-{04DFA0B4-13E0-F08D-1B1D-291B902E44C2}" dt="2025-09-26T00:33:43.447" v="22" actId="1076"/>
-          <ac:picMkLst>
-            <pc:docMk/>
-            <pc:sldMk cId="0" sldId="257"/>
-            <ac:picMk id="11" creationId="{16012876-1C84-8DE5-9B13-5905E424B1C3}"/>
-          </ac:picMkLst>
-        </pc:picChg>
-        <pc:picChg chg="del">
-          <ac:chgData name="ADAILTON DE JESUS CERQUEIRA JUNIOR" userId="S::adailton.cerqueira@ulife.com.br::4fde272d-0841-4e9c-8bd1-5d76f6d1716c" providerId="AD" clId="Web-{04DFA0B4-13E0-F08D-1B1D-291B902E44C2}" dt="2025-09-26T00:28:06.861" v="0"/>
-          <ac:picMkLst>
-            <pc:docMk/>
-            <pc:sldMk cId="0" sldId="257"/>
-            <ac:picMk id="12" creationId="{00000000-0000-0000-0000-000000000000}"/>
-          </ac:picMkLst>
-        </pc:picChg>
-        <pc:picChg chg="add mod">
-          <ac:chgData name="ADAILTON DE JESUS CERQUEIRA JUNIOR" userId="S::adailton.cerqueira@ulife.com.br::4fde272d-0841-4e9c-8bd1-5d76f6d1716c" providerId="AD" clId="Web-{04DFA0B4-13E0-F08D-1B1D-291B902E44C2}" dt="2025-09-26T00:53:20.404" v="233" actId="1076"/>
-          <ac:picMkLst>
-            <pc:docMk/>
-            <pc:sldMk cId="0" sldId="257"/>
-            <ac:picMk id="13" creationId="{22B7F8E9-EA4A-C4A3-891A-40C2F5F7723B}"/>
-          </ac:picMkLst>
-        </pc:picChg>
-      </pc:sldChg>
-    </pc:docChg>
-  </pc:docChgLst>
-  <pc:docChgLst>
-    <pc:chgData name="Gabriel Souza" userId="3aec459d9ad26342" providerId="LiveId" clId="{81108645-B148-42B2-9650-2E0488FE199C}"/>
-    <pc:docChg chg="undo custSel modSld">
-      <pc:chgData name="Gabriel Souza" userId="3aec459d9ad26342" providerId="LiveId" clId="{81108645-B148-42B2-9650-2E0488FE199C}" dt="2025-11-18T18:24:14.666" v="472" actId="1076"/>
-      <pc:docMkLst>
-        <pc:docMk/>
-      </pc:docMkLst>
-      <pc:sldChg chg="addSp delSp modSp mod">
-        <pc:chgData name="Gabriel Souza" userId="3aec459d9ad26342" providerId="LiveId" clId="{81108645-B148-42B2-9650-2E0488FE199C}" dt="2025-11-18T18:24:14.666" v="472" actId="1076"/>
-        <pc:sldMkLst>
-          <pc:docMk/>
-          <pc:sldMk cId="0" sldId="257"/>
-        </pc:sldMkLst>
-        <pc:spChg chg="mod">
-          <ac:chgData name="Gabriel Souza" userId="3aec459d9ad26342" providerId="LiveId" clId="{81108645-B148-42B2-9650-2E0488FE199C}" dt="2025-10-31T18:39:40.859" v="40" actId="20577"/>
-          <ac:spMkLst>
-            <pc:docMk/>
-            <pc:sldMk cId="0" sldId="257"/>
-            <ac:spMk id="2" creationId="{00000000-0000-0000-0000-000000000000}"/>
-          </ac:spMkLst>
-        </pc:spChg>
-        <pc:spChg chg="mod">
-          <ac:chgData name="Gabriel Souza" userId="3aec459d9ad26342" providerId="LiveId" clId="{81108645-B148-42B2-9650-2E0488FE199C}" dt="2025-11-18T18:24:11.855" v="471" actId="20577"/>
-          <ac:spMkLst>
-            <pc:docMk/>
-            <pc:sldMk cId="0" sldId="257"/>
-            <ac:spMk id="3" creationId="{00000000-0000-0000-0000-000000000000}"/>
-          </ac:spMkLst>
-        </pc:spChg>
-        <pc:spChg chg="mod">
-          <ac:chgData name="Gabriel Souza" userId="3aec459d9ad26342" providerId="LiveId" clId="{81108645-B148-42B2-9650-2E0488FE199C}" dt="2025-11-15T13:01:02.568" v="296" actId="313"/>
-          <ac:spMkLst>
-            <pc:docMk/>
-            <pc:sldMk cId="0" sldId="257"/>
-            <ac:spMk id="15" creationId="{00000000-0000-0000-0000-000000000000}"/>
-          </ac:spMkLst>
-        </pc:spChg>
-        <pc:spChg chg="mod">
-          <ac:chgData name="Gabriel Souza" userId="3aec459d9ad26342" providerId="LiveId" clId="{81108645-B148-42B2-9650-2E0488FE199C}" dt="2025-11-15T13:01:26.659" v="298" actId="1076"/>
-          <ac:spMkLst>
-            <pc:docMk/>
-            <pc:sldMk cId="0" sldId="257"/>
-            <ac:spMk id="17" creationId="{00000000-0000-0000-0000-000000000000}"/>
-          </ac:spMkLst>
-        </pc:spChg>
-        <pc:graphicFrameChg chg="del">
-          <ac:chgData name="Gabriel Souza" userId="3aec459d9ad26342" providerId="LiveId" clId="{81108645-B148-42B2-9650-2E0488FE199C}" dt="2025-10-31T19:38:05.350" v="93" actId="478"/>
-          <ac:graphicFrameMkLst>
-            <pc:docMk/>
-            <pc:sldMk cId="0" sldId="257"/>
-            <ac:graphicFrameMk id="8" creationId="{00000000-0000-0000-0000-000000000000}"/>
-          </ac:graphicFrameMkLst>
-        </pc:graphicFrameChg>
-        <pc:picChg chg="add mod">
-          <ac:chgData name="Gabriel Souza" userId="3aec459d9ad26342" providerId="LiveId" clId="{81108645-B148-42B2-9650-2E0488FE199C}" dt="2025-11-13T23:42:30.004" v="254" actId="1076"/>
-          <ac:picMkLst>
-            <pc:docMk/>
-            <pc:sldMk cId="0" sldId="257"/>
-            <ac:picMk id="8" creationId="{47EA2AF3-87B7-48A8-9F41-A772F18C6AD4}"/>
-          </ac:picMkLst>
-        </pc:picChg>
-        <pc:picChg chg="add del mod">
-          <ac:chgData name="Gabriel Souza" userId="3aec459d9ad26342" providerId="LiveId" clId="{81108645-B148-42B2-9650-2E0488FE199C}" dt="2025-11-13T23:32:53.386" v="209" actId="478"/>
-          <ac:picMkLst>
-            <pc:docMk/>
-            <pc:sldMk cId="0" sldId="257"/>
-            <ac:picMk id="10" creationId="{0965D759-C48D-4FB7-95A4-FA144F2E93F1}"/>
-          </ac:picMkLst>
-        </pc:picChg>
-        <pc:picChg chg="add mod">
-          <ac:chgData name="Gabriel Souza" userId="3aec459d9ad26342" providerId="LiveId" clId="{81108645-B148-42B2-9650-2E0488FE199C}" dt="2025-11-18T18:24:14.666" v="472" actId="1076"/>
-          <ac:picMkLst>
-            <pc:docMk/>
-            <pc:sldMk cId="0" sldId="257"/>
-            <ac:picMk id="10" creationId="{4588763E-3995-49A8-AB35-37DF4E5044CE}"/>
-          </ac:picMkLst>
-        </pc:picChg>
-        <pc:picChg chg="del">
-          <ac:chgData name="Gabriel Souza" userId="3aec459d9ad26342" providerId="LiveId" clId="{81108645-B148-42B2-9650-2E0488FE199C}" dt="2025-10-31T18:40:52.652" v="42" actId="478"/>
-          <ac:picMkLst>
-            <pc:docMk/>
-            <pc:sldMk cId="0" sldId="257"/>
-            <ac:picMk id="13" creationId="{22B7F8E9-EA4A-C4A3-891A-40C2F5F7723B}"/>
-          </ac:picMkLst>
-        </pc:picChg>
-      </pc:sldChg>
-    </pc:docChg>
-  </pc:docChgLst>
-</pc:chgInfo>
+<file path=ppt/revisionInfo.xml><?xml version="1.0" encoding="utf-8"?>
+<p1510:revInfo xmlns:a="http://schemas.openxmlformats.org/drawingml/2006/main" xmlns:r="http://schemas.openxmlformats.org/officeDocument/2006/relationships" xmlns:p1510="http://schemas.microsoft.com/office/powerpoint/2015/10/main">
+  <p1510:revLst>
+    <p1510:client id="{C51C771D-28EA-B62A-DB65-5C55CEF7F68C}" v="96" dt="2025-11-19T22:24:57.847"/>
+  </p1510:revLst>
+</p1510:revInfo>
 </file>
 
 <file path=ppt/slideLayouts/slideLayout1.xml><?xml version="1.0" encoding="utf-8"?>
@@ -505,7 +316,7 @@
             <a:fld id="{B34088D9-6F99-4774-8F18-D88D64460132}" type="datetimeFigureOut">
               <a:rPr lang="pt-BR" smtClean="0"/>
               <a:pPr/>
-              <a:t>18/11/2025</a:t>
+              <a:t>20/11/2025</a:t>
             </a:fld>
             <a:endParaRPr lang="pt-BR"/>
           </a:p>
@@ -720,7 +531,7 @@
             <a:fld id="{B34088D9-6F99-4774-8F18-D88D64460132}" type="datetimeFigureOut">
               <a:rPr lang="pt-BR" smtClean="0"/>
               <a:pPr/>
-              <a:t>18/11/2025</a:t>
+              <a:t>20/11/2025</a:t>
             </a:fld>
             <a:endParaRPr lang="pt-BR"/>
           </a:p>
@@ -1101,7 +912,7 @@
         </p:nvSpPr>
         <p:spPr>
           <a:xfrm>
-            <a:off x="0" y="-288332"/>
+            <a:off x="-120685" y="-710731"/>
             <a:ext cx="32412863" cy="43205400"/>
           </a:xfrm>
           <a:prstGeom prst="rect">
@@ -1212,8 +1023,8 @@
         </p:nvSpPr>
         <p:spPr>
           <a:xfrm>
-            <a:off x="696254" y="11970852"/>
-            <a:ext cx="14785564" cy="24537504"/>
+            <a:off x="635911" y="11111750"/>
+            <a:ext cx="14845906" cy="23209964"/>
           </a:xfrm>
           <a:ln>
             <a:noFill/>
@@ -1266,10 +1077,77 @@
                 <a:solidFill>
                   <a:schemeClr val="tx1"/>
                 </a:solidFill>
-                <a:latin typeface="Arial" panose="020B0604020202020204" pitchFamily="34" charset="0"/>
-                <a:cs typeface="Arial" panose="020B0604020202020204" pitchFamily="34" charset="0"/>
-              </a:rPr>
-              <a:t>  Simulador 2D (pygame) de um cruzamento controlado por lógica Fuzzy. O sistema usa variáveis linguísticas (fluxo de carros, fluxo de pedestres, horário e clima) para recompor dinamicamente o tempo do verde do semáforo. A base de regras Fuzzy avalia padrões do ambiente e recomenda tempo de semáforo; o estado e decisões são exibidos na HUD da aplicação e logs de ativação são impressos para análise.</a:t>
+                <a:latin typeface="Arial"/>
+                <a:ea typeface="+mn-lt"/>
+                <a:cs typeface="+mn-lt"/>
+              </a:rPr>
+              <a:t>O projeto apresenta um simulador 2D desenvolvido em </a:t>
+            </a:r>
+            <a:r>
+              <a:rPr lang="pt-BR" sz="3200" dirty="0" err="1">
+                <a:solidFill>
+                  <a:schemeClr val="tx1"/>
+                </a:solidFill>
+                <a:latin typeface="Arial"/>
+                <a:ea typeface="+mn-lt"/>
+                <a:cs typeface="+mn-lt"/>
+              </a:rPr>
+              <a:t>pygame</a:t>
+            </a:r>
+            <a:r>
+              <a:rPr lang="pt-BR" sz="3200" dirty="0">
+                <a:solidFill>
+                  <a:schemeClr val="tx1"/>
+                </a:solidFill>
+                <a:latin typeface="Arial"/>
+                <a:ea typeface="+mn-lt"/>
+                <a:cs typeface="+mn-lt"/>
+              </a:rPr>
+              <a:t> para modelar o funcionamento de um cruzamento urbano controlado por um sistema de lógica </a:t>
+            </a:r>
+            <a:r>
+              <a:rPr lang="pt-BR" sz="3200" dirty="0" err="1">
+                <a:solidFill>
+                  <a:schemeClr val="tx1"/>
+                </a:solidFill>
+                <a:latin typeface="Arial"/>
+                <a:ea typeface="+mn-lt"/>
+                <a:cs typeface="+mn-lt"/>
+              </a:rPr>
+              <a:t>Fuzzy</a:t>
+            </a:r>
+            <a:r>
+              <a:rPr lang="pt-BR" sz="3200" dirty="0">
+                <a:solidFill>
+                  <a:schemeClr val="tx1"/>
+                </a:solidFill>
+                <a:latin typeface="Arial"/>
+                <a:ea typeface="+mn-lt"/>
+                <a:cs typeface="+mn-lt"/>
+              </a:rPr>
+              <a:t>. O controlador utiliza variáveis linguísticas como fluxo de carros, fluxo de pedestres, horário e clima para ajustar dinamicamente o tempo de abertura do semáforo, tornando-o mais sensível às condições reais do ambiente. A base de regras </a:t>
+            </a:r>
+            <a:r>
+              <a:rPr lang="pt-BR" sz="3200" dirty="0" err="1">
+                <a:solidFill>
+                  <a:schemeClr val="tx1"/>
+                </a:solidFill>
+                <a:latin typeface="Arial"/>
+                <a:ea typeface="+mn-lt"/>
+                <a:cs typeface="+mn-lt"/>
+              </a:rPr>
+              <a:t>Fuzzy</a:t>
+            </a:r>
+            <a:r>
+              <a:rPr lang="pt-BR" sz="3200" dirty="0">
+                <a:solidFill>
+                  <a:schemeClr val="tx1"/>
+                </a:solidFill>
+                <a:latin typeface="Arial"/>
+                <a:ea typeface="+mn-lt"/>
+                <a:cs typeface="+mn-lt"/>
+              </a:rPr>
+              <a:t> analisa padrões contextuais e recomenda o tempo ideal de luz verde, enquanto o estado atual do sistema, as decisões tomadas e os níveis de ativação das regras são exibidos diretamente na interface (HUD) e registrados em log para análise detalhada. O objetivo é integrar um controlador capaz de otimizar automaticamente o tempo do semáforo sem comprometer a heurística de prioridade já existente, reduzindo esperas desnecessárias, priorizando fluxos críticos como horários de pico ou condições de chuva o processo.</a:t>
             </a:r>
           </a:p>
           <a:p>
@@ -1300,15 +1178,8 @@
                 <a:latin typeface="Arial" panose="020B0604020202020204" pitchFamily="34" charset="0"/>
                 <a:cs typeface="Arial" panose="020B0604020202020204" pitchFamily="34" charset="0"/>
               </a:rPr>
-              <a:t>OBJETIVO</a:t>
-            </a:r>
-            <a:endParaRPr lang="pt-BR" sz="2000" b="1" dirty="0">
-              <a:solidFill>
-                <a:schemeClr val="tx1"/>
-              </a:solidFill>
-              <a:latin typeface="Arial" panose="020B0604020202020204" pitchFamily="34" charset="0"/>
-              <a:cs typeface="Arial" panose="020B0604020202020204" pitchFamily="34" charset="0"/>
-            </a:endParaRPr>
+              <a:t>METODOLOGIA</a:t>
+            </a:r>
           </a:p>
           <a:p>
             <a:pPr algn="just">
@@ -1335,11 +1206,341 @@
                 <a:solidFill>
                   <a:schemeClr val="tx1"/>
                 </a:solidFill>
+                <a:latin typeface="Arial"/>
+                <a:ea typeface="+mn-lt"/>
+                <a:cs typeface="+mn-lt"/>
+              </a:rPr>
+              <a:t>A etapa de </a:t>
+            </a:r>
+            <a:r>
+              <a:rPr lang="pt-BR" sz="3200" dirty="0" err="1">
+                <a:solidFill>
+                  <a:schemeClr val="tx1"/>
+                </a:solidFill>
+                <a:latin typeface="Arial"/>
+                <a:ea typeface="+mn-lt"/>
+                <a:cs typeface="+mn-lt"/>
+              </a:rPr>
+              <a:t>fuzzificação</a:t>
+            </a:r>
+            <a:r>
+              <a:rPr lang="pt-BR" sz="3200" dirty="0">
+                <a:solidFill>
+                  <a:schemeClr val="tx1"/>
+                </a:solidFill>
+                <a:latin typeface="Arial"/>
+                <a:ea typeface="+mn-lt"/>
+                <a:cs typeface="+mn-lt"/>
+              </a:rPr>
+              <a:t> utiliza funções de pertinência "</a:t>
+            </a:r>
+            <a:r>
+              <a:rPr lang="pt-BR" sz="3200" i="1" dirty="0">
+                <a:solidFill>
+                  <a:schemeClr val="tx1"/>
+                </a:solidFill>
+                <a:latin typeface="Arial"/>
+                <a:ea typeface="+mn-lt"/>
+                <a:cs typeface="+mn-lt"/>
+              </a:rPr>
+              <a:t>trimf"</a:t>
+            </a:r>
+            <a:r>
+              <a:rPr lang="pt-BR" sz="3200" dirty="0">
+                <a:solidFill>
+                  <a:schemeClr val="tx1"/>
+                </a:solidFill>
+                <a:latin typeface="Arial"/>
+                <a:ea typeface="+mn-lt"/>
+                <a:cs typeface="+mn-lt"/>
+              </a:rPr>
+              <a:t> para transformar fluxo de carros, fluxo de pedestres, horário e clima em graus linguísticos dentro de seus universos numéricos. A inferência é conduzida por nove regras Fuzzy implementadas com </a:t>
+            </a:r>
+            <a:r>
+              <a:rPr lang="pt-BR" sz="3200" dirty="0">
+                <a:solidFill>
+                  <a:schemeClr val="tx1"/>
+                </a:solidFill>
+                <a:latin typeface="Arial"/>
+                <a:ea typeface="Calibri"/>
+                <a:cs typeface="Calibri"/>
+              </a:rPr>
+              <a:t>"</a:t>
+            </a:r>
+            <a:r>
+              <a:rPr lang="pt-BR" sz="3200" dirty="0" err="1">
+                <a:solidFill>
+                  <a:schemeClr val="tx1"/>
+                </a:solidFill>
+                <a:latin typeface="Arial"/>
+                <a:cs typeface="Arial"/>
+              </a:rPr>
+              <a:t>skfuzzy.ctrl.Rule</a:t>
+            </a:r>
+            <a:r>
+              <a:rPr lang="pt-BR" sz="3200" dirty="0">
+                <a:solidFill>
+                  <a:schemeClr val="tx1"/>
+                </a:solidFill>
+                <a:latin typeface="Arial"/>
+                <a:ea typeface="+mn-lt"/>
+                <a:cs typeface="Arial"/>
+              </a:rPr>
+              <a:t>"</a:t>
+            </a:r>
+            <a:r>
+              <a:rPr lang="pt-BR" sz="3200" dirty="0">
+                <a:solidFill>
+                  <a:schemeClr val="tx1"/>
+                </a:solidFill>
+                <a:latin typeface="Arial"/>
+                <a:ea typeface="+mn-lt"/>
+                <a:cs typeface="+mn-lt"/>
+              </a:rPr>
+              <a:t>, onde combinações AND/OR são avaliadas pelos métodos min e max. A </a:t>
+            </a:r>
+            <a:r>
+              <a:rPr lang="pt-BR" sz="3200" dirty="0" err="1">
+                <a:solidFill>
+                  <a:schemeClr val="tx1"/>
+                </a:solidFill>
+                <a:latin typeface="Arial"/>
+                <a:ea typeface="+mn-lt"/>
+                <a:cs typeface="+mn-lt"/>
+              </a:rPr>
+              <a:t>defuzzificação</a:t>
+            </a:r>
+            <a:r>
+              <a:rPr lang="pt-BR" sz="3200" dirty="0">
+                <a:solidFill>
+                  <a:schemeClr val="tx1"/>
+                </a:solidFill>
+                <a:latin typeface="Arial"/>
+                <a:ea typeface="+mn-lt"/>
+                <a:cs typeface="+mn-lt"/>
+              </a:rPr>
+              <a:t> usa o método do centroide para gerar um valor nítido correspondente ao tempo recomendado de semáforo. O sistema ainda inclui uma heurística adicional que calcula um índice de prioridade (0–10) para manter compatibilidade com a lógica já existente. Para fins de diagnóstico, a função </a:t>
+            </a:r>
+            <a:r>
+              <a:rPr lang="pt-BR" sz="3200" dirty="0">
+                <a:solidFill>
+                  <a:schemeClr val="tx1"/>
+                </a:solidFill>
+                <a:latin typeface="Arial"/>
+                <a:ea typeface="Calibri"/>
+                <a:cs typeface="Calibri"/>
+              </a:rPr>
+              <a:t>"</a:t>
+            </a:r>
+            <a:r>
+              <a:rPr lang="pt-BR" sz="3200" dirty="0" err="1">
+                <a:solidFill>
+                  <a:schemeClr val="tx1"/>
+                </a:solidFill>
+                <a:latin typeface="Arial"/>
+                <a:cs typeface="Arial"/>
+              </a:rPr>
+              <a:t>avaliar_regras</a:t>
+            </a:r>
+            <a:r>
+              <a:rPr lang="pt-BR" sz="3200" dirty="0">
+                <a:solidFill>
+                  <a:schemeClr val="tx1"/>
+                </a:solidFill>
+                <a:latin typeface="Arial"/>
+                <a:ea typeface="+mn-lt"/>
+                <a:cs typeface="Arial"/>
+              </a:rPr>
+              <a:t>"</a:t>
+            </a:r>
+            <a:r>
+              <a:rPr lang="pt-BR" sz="3200" dirty="0">
+                <a:solidFill>
+                  <a:schemeClr val="tx1"/>
+                </a:solidFill>
+                <a:latin typeface="Arial"/>
+                <a:ea typeface="+mn-lt"/>
+                <a:cs typeface="+mn-lt"/>
+              </a:rPr>
+              <a:t> registra quais regras foram ativadas, seus graus de ativação e os logs associados, permitindo análise e calibração precisas.</a:t>
+            </a:r>
+          </a:p>
+          <a:p>
+            <a:pPr algn="just">
+              <a:spcBef>
+                <a:spcPts val="0"/>
+              </a:spcBef>
+            </a:pPr>
+            <a:endParaRPr lang="pt-BR" sz="2800" dirty="0">
+              <a:solidFill>
+                <a:schemeClr val="tx1"/>
+              </a:solidFill>
+              <a:latin typeface="Arial" panose="020B0604020202020204" pitchFamily="34" charset="0"/>
+              <a:cs typeface="Arial" panose="020B0604020202020204" pitchFamily="34" charset="0"/>
+            </a:endParaRPr>
+          </a:p>
+          <a:p>
+            <a:pPr algn="just">
+              <a:spcBef>
+                <a:spcPts val="0"/>
+              </a:spcBef>
+            </a:pPr>
+            <a:r>
+              <a:rPr lang="pt-BR" sz="6600" b="1" dirty="0">
+                <a:solidFill>
+                  <a:schemeClr val="tx1"/>
+                </a:solidFill>
                 <a:latin typeface="Arial" panose="020B0604020202020204" pitchFamily="34" charset="0"/>
                 <a:cs typeface="Arial" panose="020B0604020202020204" pitchFamily="34" charset="0"/>
               </a:rPr>
-              <a:t>   Integrar um controlador Fuzzy que ajuste automaticamente o tempo verde conforme condições reais do ambiente, mantendo compatibilidade com a heurística de prioridade existente. Reduzir esperas indevidas, priorizar fluxos críticos (picos/chuva) e fornecer telemetria (regras ativadas, grau de ativação, tempo recomendado) para facilitar calibração.</a:t>
-            </a:r>
+              <a:t>RESULTADOS</a:t>
+            </a:r>
+          </a:p>
+          <a:p>
+            <a:pPr algn="just">
+              <a:spcBef>
+                <a:spcPts val="0"/>
+              </a:spcBef>
+            </a:pPr>
+            <a:endParaRPr lang="pt-BR" sz="3200" b="1" dirty="0">
+              <a:solidFill>
+                <a:schemeClr val="tx1"/>
+              </a:solidFill>
+              <a:latin typeface="Arial" panose="020B0604020202020204" pitchFamily="34" charset="0"/>
+              <a:cs typeface="Arial" panose="020B0604020202020204" pitchFamily="34" charset="0"/>
+            </a:endParaRPr>
+          </a:p>
+          <a:p>
+            <a:pPr algn="just"/>
+            <a:r>
+              <a:rPr lang="pt-BR" sz="3200" dirty="0">
+                <a:solidFill>
+                  <a:schemeClr val="tx1"/>
+                </a:solidFill>
+                <a:latin typeface="Arial"/>
+                <a:cs typeface="Arial"/>
+              </a:rPr>
+              <a:t>  </a:t>
+            </a:r>
+            <a:r>
+              <a:rPr lang="pt-BR" sz="3200" dirty="0">
+                <a:solidFill>
+                  <a:schemeClr val="tx1"/>
+                </a:solidFill>
+                <a:latin typeface="Arial"/>
+                <a:ea typeface="+mn-lt"/>
+                <a:cs typeface="+mn-lt"/>
+              </a:rPr>
+              <a:t>Após a implementação completa do sistema — incluindo </a:t>
+            </a:r>
+            <a:r>
+              <a:rPr lang="pt-BR" sz="3200" dirty="0" err="1">
+                <a:solidFill>
+                  <a:schemeClr val="tx1"/>
+                </a:solidFill>
+                <a:latin typeface="Arial"/>
+                <a:ea typeface="+mn-lt"/>
+                <a:cs typeface="+mn-lt"/>
+              </a:rPr>
+              <a:t>fuzzificação</a:t>
+            </a:r>
+            <a:r>
+              <a:rPr lang="pt-BR" sz="3200" dirty="0">
+                <a:solidFill>
+                  <a:schemeClr val="tx1"/>
+                </a:solidFill>
+                <a:latin typeface="Arial"/>
+                <a:ea typeface="+mn-lt"/>
+                <a:cs typeface="+mn-lt"/>
+              </a:rPr>
+              <a:t> com funções </a:t>
+            </a:r>
+            <a:r>
+              <a:rPr lang="pt-BR" sz="3200" i="1" dirty="0">
+                <a:solidFill>
+                  <a:schemeClr val="tx1"/>
+                </a:solidFill>
+                <a:latin typeface="Arial"/>
+                <a:ea typeface="+mn-lt"/>
+                <a:cs typeface="+mn-lt"/>
+              </a:rPr>
+              <a:t>trimf</a:t>
+            </a:r>
+            <a:r>
+              <a:rPr lang="pt-BR" sz="3200" dirty="0">
+                <a:solidFill>
+                  <a:schemeClr val="tx1"/>
+                </a:solidFill>
+                <a:latin typeface="Arial"/>
+                <a:ea typeface="+mn-lt"/>
+                <a:cs typeface="+mn-lt"/>
+              </a:rPr>
+              <a:t>, nove regras de inferência e </a:t>
+            </a:r>
+            <a:r>
+              <a:rPr lang="pt-BR" sz="3200" dirty="0" err="1">
+                <a:solidFill>
+                  <a:schemeClr val="tx1"/>
+                </a:solidFill>
+                <a:latin typeface="Arial"/>
+                <a:ea typeface="+mn-lt"/>
+                <a:cs typeface="+mn-lt"/>
+              </a:rPr>
+              <a:t>defuzzificação</a:t>
+            </a:r>
+            <a:r>
+              <a:rPr lang="pt-BR" sz="3200" dirty="0">
+                <a:solidFill>
+                  <a:schemeClr val="tx1"/>
+                </a:solidFill>
+                <a:latin typeface="Arial"/>
+                <a:ea typeface="+mn-lt"/>
+                <a:cs typeface="+mn-lt"/>
+              </a:rPr>
+              <a:t> por centroide — o controlador Fuzzy ajustou corretamente o tempo de verde do semáforo conforme as condições simuladas. O sistema passou a responder em tempo real ao fluxo de carros, pedestres, horário e clima, exibindo na HUD o tempo recomendado e registrando, em log, as regras ativadas e seus respectivos graus de ativação.</a:t>
+            </a:r>
+          </a:p>
+          <a:p>
+            <a:pPr algn="just"/>
+            <a:r>
+              <a:rPr lang="pt-BR" sz="3200" dirty="0">
+                <a:solidFill>
+                  <a:schemeClr val="tx1"/>
+                </a:solidFill>
+                <a:latin typeface="Arial"/>
+                <a:ea typeface="+mn-lt"/>
+                <a:cs typeface="+mn-lt"/>
+              </a:rPr>
+              <a:t>Os gráficos gerados permitiram observar o comportamento das funções de pertinência e da saída </a:t>
+            </a:r>
+            <a:r>
+              <a:rPr lang="pt-BR" sz="3200" dirty="0" err="1">
+                <a:solidFill>
+                  <a:schemeClr val="tx1"/>
+                </a:solidFill>
+                <a:latin typeface="Arial"/>
+                <a:ea typeface="+mn-lt"/>
+                <a:cs typeface="+mn-lt"/>
+              </a:rPr>
+              <a:t>defuzzificada</a:t>
+            </a:r>
+            <a:r>
+              <a:rPr lang="pt-BR" sz="3200" dirty="0">
+                <a:solidFill>
+                  <a:schemeClr val="tx1"/>
+                </a:solidFill>
+                <a:latin typeface="Arial"/>
+                <a:ea typeface="+mn-lt"/>
+                <a:cs typeface="+mn-lt"/>
+              </a:rPr>
+              <a:t>, confirmando que o tempo de semáforo aumentou em cenários críticos (como fluxo alto ou chuva) e diminuiu em situações de baixa demanda.</a:t>
+            </a:r>
+            <a:endParaRPr lang="pt-BR" dirty="0">
+              <a:solidFill>
+                <a:schemeClr val="tx1"/>
+              </a:solidFill>
+              <a:latin typeface="Arial"/>
+            </a:endParaRPr>
           </a:p>
           <a:p>
             <a:pPr algn="just">
@@ -1361,194 +1562,6 @@
                 <a:spcPts val="0"/>
               </a:spcBef>
             </a:pPr>
-            <a:r>
-              <a:rPr lang="pt-BR" sz="6600" b="1" dirty="0">
-                <a:solidFill>
-                  <a:schemeClr val="tx1"/>
-                </a:solidFill>
-                <a:latin typeface="Arial" panose="020B0604020202020204" pitchFamily="34" charset="0"/>
-                <a:cs typeface="Arial" panose="020B0604020202020204" pitchFamily="34" charset="0"/>
-              </a:rPr>
-              <a:t>MÉTODOS</a:t>
-            </a:r>
-          </a:p>
-          <a:p>
-            <a:pPr algn="just">
-              <a:spcBef>
-                <a:spcPts val="0"/>
-              </a:spcBef>
-            </a:pPr>
-            <a:endParaRPr lang="pt-BR" sz="2000" b="1" dirty="0">
-              <a:solidFill>
-                <a:schemeClr val="tx1"/>
-              </a:solidFill>
-              <a:latin typeface="Arial" panose="020B0604020202020204" pitchFamily="34" charset="0"/>
-              <a:cs typeface="Arial" panose="020B0604020202020204" pitchFamily="34" charset="0"/>
-            </a:endParaRPr>
-          </a:p>
-          <a:p>
-            <a:pPr marL="457200" indent="-457200" algn="just">
-              <a:spcBef>
-                <a:spcPts val="0"/>
-              </a:spcBef>
-              <a:buFont typeface="Arial" panose="020B0604020202020204" pitchFamily="34" charset="0"/>
-              <a:buChar char="•"/>
-            </a:pPr>
-            <a:r>
-              <a:rPr lang="pt-BR" sz="3200" dirty="0">
-                <a:solidFill>
-                  <a:schemeClr val="tx1"/>
-                </a:solidFill>
-                <a:latin typeface="Arial" panose="020B0604020202020204" pitchFamily="34" charset="0"/>
-                <a:cs typeface="Arial" panose="020B0604020202020204" pitchFamily="34" charset="0"/>
-              </a:rPr>
-              <a:t>   Fuzzificação: funções de pertinência (trimf) para fluxo de carros, fluxo de pedestres, horário e clima; rótulos mapeados para valores numéricos no universo.</a:t>
-            </a:r>
-          </a:p>
-          <a:p>
-            <a:pPr marL="457200" indent="-457200" algn="just">
-              <a:spcBef>
-                <a:spcPts val="0"/>
-              </a:spcBef>
-              <a:buFont typeface="Arial" panose="020B0604020202020204" pitchFamily="34" charset="0"/>
-              <a:buChar char="•"/>
-            </a:pPr>
-            <a:r>
-              <a:rPr lang="pt-BR" sz="3200" dirty="0">
-                <a:solidFill>
-                  <a:schemeClr val="tx1"/>
-                </a:solidFill>
-                <a:latin typeface="Arial" panose="020B0604020202020204" pitchFamily="34" charset="0"/>
-                <a:cs typeface="Arial" panose="020B0604020202020204" pitchFamily="34" charset="0"/>
-              </a:rPr>
-              <a:t>   Inferência: base Fuzzy com 9 regras implementadas via skfuzzy.ctrl.Rule; combinações AND/OR avaliadas por min/max.</a:t>
-            </a:r>
-          </a:p>
-          <a:p>
-            <a:pPr marL="457200" indent="-457200" algn="just">
-              <a:spcBef>
-                <a:spcPts val="0"/>
-              </a:spcBef>
-              <a:buFont typeface="Arial" panose="020B0604020202020204" pitchFamily="34" charset="0"/>
-              <a:buChar char="•"/>
-            </a:pPr>
-            <a:r>
-              <a:rPr lang="pt-BR" sz="3200" dirty="0">
-                <a:solidFill>
-                  <a:schemeClr val="tx1"/>
-                </a:solidFill>
-                <a:latin typeface="Arial" panose="020B0604020202020204" pitchFamily="34" charset="0"/>
-                <a:cs typeface="Arial" panose="020B0604020202020204" pitchFamily="34" charset="0"/>
-              </a:rPr>
-              <a:t>   Defuzzificação: centroide (ControlSystemSimulation.compute()) para produzir o tempo recomendado do semáforo.</a:t>
-            </a:r>
-          </a:p>
-          <a:p>
-            <a:pPr marL="457200" indent="-457200" algn="just">
-              <a:spcBef>
-                <a:spcPts val="0"/>
-              </a:spcBef>
-              <a:buFont typeface="Arial" panose="020B0604020202020204" pitchFamily="34" charset="0"/>
-              <a:buChar char="•"/>
-            </a:pPr>
-            <a:r>
-              <a:rPr lang="pt-BR" sz="3200" dirty="0">
-                <a:solidFill>
-                  <a:schemeClr val="tx1"/>
-                </a:solidFill>
-                <a:latin typeface="Arial" panose="020B0604020202020204" pitchFamily="34" charset="0"/>
-                <a:cs typeface="Arial" panose="020B0604020202020204" pitchFamily="34" charset="0"/>
-              </a:rPr>
-              <a:t>   Heurística adicional: cálculo de prioridade (score 0-10) para compatibilidade.</a:t>
-            </a:r>
-          </a:p>
-          <a:p>
-            <a:pPr marL="457200" indent="-457200" algn="just">
-              <a:spcBef>
-                <a:spcPts val="0"/>
-              </a:spcBef>
-              <a:buFont typeface="Arial" panose="020B0604020202020204" pitchFamily="34" charset="0"/>
-              <a:buChar char="•"/>
-            </a:pPr>
-            <a:r>
-              <a:rPr lang="pt-BR" sz="3200" dirty="0">
-                <a:solidFill>
-                  <a:schemeClr val="tx1"/>
-                </a:solidFill>
-                <a:latin typeface="Arial" panose="020B0604020202020204" pitchFamily="34" charset="0"/>
-                <a:cs typeface="Arial" panose="020B0604020202020204" pitchFamily="34" charset="0"/>
-              </a:rPr>
-              <a:t>   Diagnóstico: avaliar_regras para obter graus de ativação e logs.</a:t>
-            </a:r>
-          </a:p>
-          <a:p>
-            <a:pPr algn="just">
-              <a:spcBef>
-                <a:spcPts val="0"/>
-              </a:spcBef>
-            </a:pPr>
-            <a:endParaRPr lang="pt-BR" sz="2800" dirty="0">
-              <a:solidFill>
-                <a:schemeClr val="tx1"/>
-              </a:solidFill>
-              <a:latin typeface="Arial" panose="020B0604020202020204" pitchFamily="34" charset="0"/>
-              <a:cs typeface="Arial" panose="020B0604020202020204" pitchFamily="34" charset="0"/>
-            </a:endParaRPr>
-          </a:p>
-          <a:p>
-            <a:pPr algn="just">
-              <a:spcBef>
-                <a:spcPts val="0"/>
-              </a:spcBef>
-            </a:pPr>
-            <a:r>
-              <a:rPr lang="pt-BR" sz="6600" b="1" dirty="0">
-                <a:solidFill>
-                  <a:schemeClr val="tx1"/>
-                </a:solidFill>
-                <a:latin typeface="Arial" panose="020B0604020202020204" pitchFamily="34" charset="0"/>
-                <a:cs typeface="Arial" panose="020B0604020202020204" pitchFamily="34" charset="0"/>
-              </a:rPr>
-              <a:t>RESULTADOS</a:t>
-            </a:r>
-          </a:p>
-          <a:p>
-            <a:pPr algn="just">
-              <a:spcBef>
-                <a:spcPts val="0"/>
-              </a:spcBef>
-            </a:pPr>
-            <a:endParaRPr lang="pt-BR" sz="2000" b="1" dirty="0">
-              <a:solidFill>
-                <a:schemeClr val="tx1"/>
-              </a:solidFill>
-              <a:latin typeface="Arial" panose="020B0604020202020204" pitchFamily="34" charset="0"/>
-              <a:cs typeface="Arial" panose="020B0604020202020204" pitchFamily="34" charset="0"/>
-            </a:endParaRPr>
-          </a:p>
-          <a:p>
-            <a:pPr algn="just">
-              <a:spcBef>
-                <a:spcPts val="0"/>
-              </a:spcBef>
-            </a:pPr>
-            <a:r>
-              <a:rPr lang="pt-BR" sz="3200" dirty="0">
-                <a:solidFill>
-                  <a:schemeClr val="tx1"/>
-                </a:solidFill>
-                <a:latin typeface="Arial" panose="020B0604020202020204" pitchFamily="34" charset="0"/>
-                <a:cs typeface="Arial" panose="020B0604020202020204" pitchFamily="34" charset="0"/>
-              </a:rPr>
-              <a:t>   Implementada Fuzzificação (trimf), base de regras (9 regras conforme especificado) e Defuzzificação por centroide. O sistema ajusta tempo do verde em tempo real, imprime regras ativadas com graus, reseta cenário ao alterar ambiente e exibe tempo recomendado na HUD. Observou-se comportamento mais adaptativo a picos e chuva, com trocas mais coerentes que a heurística pura (sistema de controle de tráfego que existia antes da implementação da Lógica Fuzzy).</a:t>
-            </a:r>
-          </a:p>
-          <a:p>
-            <a:pPr algn="just">
-              <a:spcBef>
-                <a:spcPts val="0"/>
-              </a:spcBef>
-            </a:pPr>
             <a:endParaRPr lang="pt-BR" sz="3200" dirty="0">
               <a:solidFill>
                 <a:schemeClr val="tx1"/>
@@ -1563,67 +1576,7 @@
                 <a:spcPts val="0"/>
               </a:spcBef>
             </a:pPr>
-            <a:r>
-              <a:rPr lang="pt-BR" sz="6600" b="1" dirty="0">
-                <a:solidFill>
-                  <a:schemeClr val="tx1"/>
-                </a:solidFill>
-                <a:latin typeface="Arial" panose="020B0604020202020204" pitchFamily="34" charset="0"/>
-                <a:cs typeface="Arial" panose="020B0604020202020204" pitchFamily="34" charset="0"/>
-              </a:rPr>
-              <a:t>VÍDEO DA APLICAÇÃO</a:t>
-            </a:r>
-          </a:p>
-          <a:p>
-            <a:pPr algn="just">
-              <a:spcBef>
-                <a:spcPts val="0"/>
-              </a:spcBef>
-            </a:pPr>
-            <a:endParaRPr lang="pt-BR" sz="3200" b="1" dirty="0">
-              <a:solidFill>
-                <a:schemeClr val="tx1"/>
-              </a:solidFill>
-              <a:latin typeface="Arial" panose="020B0604020202020204" pitchFamily="34" charset="0"/>
-              <a:cs typeface="Arial" panose="020B0604020202020204" pitchFamily="34" charset="0"/>
-            </a:endParaRPr>
-          </a:p>
-          <a:p>
-            <a:pPr algn="just">
-              <a:spcBef>
-                <a:spcPts val="0"/>
-              </a:spcBef>
-            </a:pPr>
-            <a:r>
-              <a:rPr lang="pt-BR" sz="3600" dirty="0">
-                <a:solidFill>
-                  <a:schemeClr val="tx1"/>
-                </a:solidFill>
-                <a:latin typeface="Arial" panose="020B0604020202020204" pitchFamily="34" charset="0"/>
-                <a:cs typeface="Arial" panose="020B0604020202020204" pitchFamily="34" charset="0"/>
-                <a:hlinkClick r:id="rId2"/>
-              </a:rPr>
-              <a:t>https://drive.google.com/drive/folders/12Jot-h3</a:t>
-            </a:r>
-          </a:p>
-          <a:p>
-            <a:pPr algn="just">
-              <a:spcBef>
-                <a:spcPts val="0"/>
-              </a:spcBef>
-            </a:pPr>
-            <a:r>
-              <a:rPr lang="pt-BR" sz="3600" dirty="0">
-                <a:solidFill>
-                  <a:schemeClr val="tx1"/>
-                </a:solidFill>
-                <a:latin typeface="Arial" panose="020B0604020202020204" pitchFamily="34" charset="0"/>
-                <a:cs typeface="Arial" panose="020B0604020202020204" pitchFamily="34" charset="0"/>
-                <a:hlinkClick r:id="rId2"/>
-              </a:rPr>
-              <a:t>SRH0EXn0CtwHxpU-zRgsph41X?usp=sharing</a:t>
-            </a:r>
-            <a:endParaRPr lang="pt-BR" sz="6600" dirty="0">
+            <a:endParaRPr lang="pt-BR" sz="6600" b="1" dirty="0">
               <a:solidFill>
                 <a:schemeClr val="tx1"/>
               </a:solidFill>
@@ -1657,7 +1610,7 @@
         </p:nvSpPr>
         <p:spPr>
           <a:xfrm>
-            <a:off x="16212075" y="11970852"/>
+            <a:off x="16031047" y="10824340"/>
             <a:ext cx="15576604" cy="24332124"/>
           </a:xfrm>
           <a:prstGeom prst="rect">
@@ -1674,17 +1627,13 @@
           </a:bodyPr>
           <a:lstStyle/>
           <a:p>
-            <a:pPr algn="just">
-              <a:spcBef>
-                <a:spcPts val="0"/>
-              </a:spcBef>
-            </a:pPr>
+            <a:pPr algn="just"/>
             <a:r>
               <a:rPr lang="pt-BR" sz="6600" b="1" dirty="0">
-                <a:latin typeface="Arial" panose="020B0604020202020204" pitchFamily="34" charset="0"/>
-                <a:cs typeface="Arial" panose="020B0604020202020204" pitchFamily="34" charset="0"/>
-              </a:rPr>
-              <a:t>REGRAS FUZZY (RESUMIDAS)</a:t>
+                <a:latin typeface="Arial"/>
+                <a:cs typeface="Arial"/>
+              </a:rPr>
+              <a:t>GRÁFICOS FUZZY </a:t>
             </a:r>
           </a:p>
           <a:p>
@@ -1699,154 +1648,18 @@
             </a:endParaRPr>
           </a:p>
           <a:p>
-            <a:pPr algn="just">
-              <a:spcBef>
-                <a:spcPts val="0"/>
-              </a:spcBef>
-            </a:pPr>
-            <a:r>
-              <a:rPr lang="pt-BR" sz="3200" dirty="0">
-                <a:latin typeface="Arial" panose="020B0604020202020204" pitchFamily="34" charset="0"/>
-                <a:cs typeface="Arial" panose="020B0604020202020204" pitchFamily="34" charset="0"/>
-              </a:rPr>
-              <a:t>1) SE (Fluxo de Carros é Alto) E (Horário é de Pico) ENTÃO (Tempo é Alto).</a:t>
-            </a:r>
-          </a:p>
-          <a:p>
-            <a:pPr algn="just">
-              <a:spcBef>
-                <a:spcPts val="0"/>
-              </a:spcBef>
-            </a:pPr>
-            <a:r>
-              <a:rPr lang="pt-BR" sz="3200" dirty="0">
-                <a:latin typeface="Arial" panose="020B0604020202020204" pitchFamily="34" charset="0"/>
-                <a:cs typeface="Arial" panose="020B0604020202020204" pitchFamily="34" charset="0"/>
-              </a:rPr>
-              <a:t>2) SE (Fluxo de Carros é Médio) E (Fluxo de Pedestres é Médio) E (Horário é Normal) ENTÃO (Tempo é Médio).</a:t>
-            </a:r>
-          </a:p>
-          <a:p>
-            <a:pPr algn="just">
-              <a:spcBef>
-                <a:spcPts val="0"/>
-              </a:spcBef>
-            </a:pPr>
-            <a:r>
-              <a:rPr lang="pt-BR" sz="3200" dirty="0">
-                <a:latin typeface="Arial" panose="020B0604020202020204" pitchFamily="34" charset="0"/>
-                <a:cs typeface="Arial" panose="020B0604020202020204" pitchFamily="34" charset="0"/>
-              </a:rPr>
-              <a:t>3) SE (Fluxo de Carros é Baixo) OU (Fluxo de Pedestres é Baixo) ENTÃO (Tempo é Baixo).</a:t>
-            </a:r>
-          </a:p>
-          <a:p>
-            <a:pPr algn="just">
-              <a:spcBef>
-                <a:spcPts val="0"/>
-              </a:spcBef>
-            </a:pPr>
-            <a:r>
-              <a:rPr lang="pt-BR" sz="3200" dirty="0">
-                <a:latin typeface="Arial" panose="020B0604020202020204" pitchFamily="34" charset="0"/>
-                <a:cs typeface="Arial" panose="020B0604020202020204" pitchFamily="34" charset="0"/>
-              </a:rPr>
-              <a:t>4) SE (Fluxo de Carros é Alto) E (Fluxo de Pedestres é Alto) E (Horário é Normal) ENTÃO (Tempo é Médio).</a:t>
-            </a:r>
-          </a:p>
-          <a:p>
-            <a:pPr algn="just">
-              <a:spcBef>
-                <a:spcPts val="0"/>
-              </a:spcBef>
-            </a:pPr>
-            <a:r>
-              <a:rPr lang="pt-BR" sz="3200" dirty="0">
-                <a:latin typeface="Arial" panose="020B0604020202020204" pitchFamily="34" charset="0"/>
-                <a:cs typeface="Arial" panose="020B0604020202020204" pitchFamily="34" charset="0"/>
-              </a:rPr>
-              <a:t>5) SE (Fluxo de Carros é Alto) E (Fluxo de Pedestres é Alto) E (Horário é de Pico) ENTÃO (Tempo é Alto).</a:t>
-            </a:r>
-          </a:p>
-          <a:p>
-            <a:pPr algn="just">
-              <a:spcBef>
-                <a:spcPts val="0"/>
-              </a:spcBef>
-            </a:pPr>
-            <a:r>
-              <a:rPr lang="pt-BR" sz="3200" dirty="0">
-                <a:latin typeface="Arial" panose="020B0604020202020204" pitchFamily="34" charset="0"/>
-                <a:cs typeface="Arial" panose="020B0604020202020204" pitchFamily="34" charset="0"/>
-              </a:rPr>
-              <a:t>6) SE (Fluxo de Carros é Alto) E (Clima é Chuvoso) ENTÃO (Tempo é Alto).</a:t>
-            </a:r>
-          </a:p>
-          <a:p>
-            <a:pPr algn="just">
-              <a:spcBef>
-                <a:spcPts val="0"/>
-              </a:spcBef>
-            </a:pPr>
-            <a:r>
-              <a:rPr lang="pt-BR" sz="3200" dirty="0">
-                <a:latin typeface="Arial" panose="020B0604020202020204" pitchFamily="34" charset="0"/>
-                <a:cs typeface="Arial" panose="020B0604020202020204" pitchFamily="34" charset="0"/>
-              </a:rPr>
-              <a:t>7) SE Fluxo de Carros é Baixo E Fluxo de Pedestres é Baixo E Horário Outro ENTÃO Tempo Baixo.</a:t>
-            </a:r>
-          </a:p>
-          <a:p>
-            <a:pPr algn="just">
-              <a:spcBef>
-                <a:spcPts val="0"/>
-              </a:spcBef>
-            </a:pPr>
-            <a:r>
-              <a:rPr lang="pt-BR" sz="3200" dirty="0">
-                <a:latin typeface="Arial" panose="020B0604020202020204" pitchFamily="34" charset="0"/>
-                <a:cs typeface="Arial" panose="020B0604020202020204" pitchFamily="34" charset="0"/>
-              </a:rPr>
-              <a:t>8) SE Fluxo de Carros é Baixo E Fluxo de Pedestres é Alto ENTÃO Tempo Médio.</a:t>
-            </a:r>
-          </a:p>
-          <a:p>
-            <a:pPr algn="just">
-              <a:spcBef>
-                <a:spcPts val="0"/>
-              </a:spcBef>
-            </a:pPr>
-            <a:r>
-              <a:rPr lang="pt-BR" sz="3200" dirty="0">
-                <a:latin typeface="Arial" panose="020B0604020202020204" pitchFamily="34" charset="0"/>
-                <a:cs typeface="Arial" panose="020B0604020202020204" pitchFamily="34" charset="0"/>
-              </a:rPr>
-              <a:t>9) SE Fluxo de Carros é Médio E Horário é Outro ENTÃO Tempo Médio.</a:t>
-            </a:r>
-          </a:p>
-          <a:p>
-            <a:pPr algn="just">
-              <a:spcBef>
-                <a:spcPts val="0"/>
-              </a:spcBef>
-            </a:pPr>
-            <a:endParaRPr lang="pt-BR" sz="3600" b="1" dirty="0">
-              <a:latin typeface="Arial" panose="020B0604020202020204" pitchFamily="34" charset="0"/>
-              <a:cs typeface="Arial" panose="020B0604020202020204" pitchFamily="34" charset="0"/>
-            </a:endParaRPr>
-          </a:p>
-          <a:p>
+            <a:pPr algn="just"/>
             <a:r>
               <a:rPr lang="pt-BR" sz="4400" b="1" dirty="0">
-                <a:latin typeface="Arial" panose="020B0604020202020204" pitchFamily="34" charset="0"/>
-                <a:cs typeface="Arial" panose="020B0604020202020204" pitchFamily="34" charset="0"/>
+                <a:latin typeface="Arial"/>
+                <a:cs typeface="Arial"/>
               </a:rPr>
               <a:t>Figura 1 – Exemplo figura</a:t>
             </a:r>
             <a:endParaRPr lang="pt-BR" sz="4400" b="1" dirty="0">
-              <a:latin typeface="Arial" panose="020B0604020202020204" pitchFamily="34" charset="0"/>
+              <a:latin typeface="Arial"/>
               <a:ea typeface="Calibri"/>
-              <a:cs typeface="Arial" panose="020B0604020202020204" pitchFamily="34" charset="0"/>
+              <a:cs typeface="Arial"/>
             </a:endParaRPr>
           </a:p>
           <a:p>
@@ -1926,18 +1739,105 @@
             </a:endParaRPr>
           </a:p>
           <a:p>
-            <a:pPr algn="just">
-              <a:spcBef>
-                <a:spcPts val="0"/>
-              </a:spcBef>
-            </a:pPr>
+            <a:pPr algn="just"/>
             <a:r>
               <a:rPr lang="pt-BR" sz="6600" b="1" dirty="0">
-                <a:latin typeface="Arial" panose="020B0604020202020204" pitchFamily="34" charset="0"/>
-                <a:cs typeface="Arial" panose="020B0604020202020204" pitchFamily="34" charset="0"/>
-              </a:rPr>
-              <a:t> CONCLUSÃO</a:t>
-            </a:r>
+                <a:latin typeface="Arial"/>
+                <a:cs typeface="Arial"/>
+              </a:rPr>
+              <a:t> </a:t>
+            </a:r>
+          </a:p>
+          <a:p>
+            <a:pPr algn="just"/>
+            <a:endParaRPr lang="pt-BR" sz="6600" b="1" dirty="0">
+              <a:latin typeface="Arial"/>
+              <a:cs typeface="Arial"/>
+            </a:endParaRPr>
+          </a:p>
+          <a:p>
+            <a:pPr algn="just"/>
+            <a:endParaRPr lang="pt-BR" sz="6600" b="1" dirty="0">
+              <a:latin typeface="Arial"/>
+              <a:cs typeface="Arial"/>
+            </a:endParaRPr>
+          </a:p>
+          <a:p>
+            <a:pPr algn="just"/>
+            <a:endParaRPr lang="pt-BR" sz="6600" b="1" dirty="0">
+              <a:latin typeface="Arial"/>
+              <a:cs typeface="Arial"/>
+            </a:endParaRPr>
+          </a:p>
+          <a:p>
+            <a:pPr algn="just"/>
+            <a:endParaRPr lang="pt-BR" sz="6600" b="1" dirty="0">
+              <a:latin typeface="Arial"/>
+              <a:cs typeface="Arial"/>
+            </a:endParaRPr>
+          </a:p>
+          <a:p>
+            <a:pPr algn="just"/>
+            <a:endParaRPr lang="pt-BR" sz="6600" b="1" dirty="0">
+              <a:latin typeface="Arial"/>
+              <a:cs typeface="Arial"/>
+            </a:endParaRPr>
+          </a:p>
+          <a:p>
+            <a:pPr algn="just"/>
+            <a:endParaRPr lang="pt-BR" sz="6600" b="1" dirty="0">
+              <a:latin typeface="Arial"/>
+              <a:cs typeface="Arial"/>
+            </a:endParaRPr>
+          </a:p>
+          <a:p>
+            <a:pPr algn="just"/>
+            <a:endParaRPr lang="pt-BR" sz="6600" b="1" dirty="0">
+              <a:latin typeface="Arial"/>
+              <a:cs typeface="Arial"/>
+            </a:endParaRPr>
+          </a:p>
+          <a:p>
+            <a:pPr algn="just"/>
+            <a:endParaRPr lang="pt-BR" sz="6600" b="1" dirty="0">
+              <a:latin typeface="Arial"/>
+              <a:cs typeface="Arial"/>
+            </a:endParaRPr>
+          </a:p>
+          <a:p>
+            <a:pPr algn="just"/>
+            <a:endParaRPr lang="pt-BR" sz="6600" b="1" dirty="0">
+              <a:latin typeface="Arial"/>
+              <a:cs typeface="Arial"/>
+            </a:endParaRPr>
+          </a:p>
+          <a:p>
+            <a:pPr algn="just"/>
+            <a:endParaRPr lang="pt-BR" sz="6600" b="1" dirty="0">
+              <a:latin typeface="Arial"/>
+              <a:cs typeface="Arial"/>
+            </a:endParaRPr>
+          </a:p>
+          <a:p>
+            <a:pPr algn="just"/>
+            <a:endParaRPr lang="pt-BR" sz="6600" b="1" dirty="0">
+              <a:latin typeface="Arial"/>
+              <a:cs typeface="Arial"/>
+            </a:endParaRPr>
+          </a:p>
+          <a:p>
+            <a:pPr algn="just"/>
+            <a:r>
+              <a:rPr lang="pt-BR" sz="6600" b="1" dirty="0">
+                <a:latin typeface="Arial"/>
+                <a:cs typeface="Arial"/>
+              </a:rPr>
+              <a:t>CONCLUSÃO</a:t>
+            </a:r>
+            <a:endParaRPr lang="pt-BR" dirty="0">
+              <a:ea typeface="Calibri"/>
+              <a:cs typeface="Calibri"/>
+            </a:endParaRPr>
           </a:p>
           <a:p>
             <a:pPr algn="just">
@@ -2097,8 +1997,8 @@
         </p:nvSpPr>
         <p:spPr>
           <a:xfrm>
-            <a:off x="696254" y="36609241"/>
-            <a:ext cx="30749932" cy="5903380"/>
+            <a:off x="635911" y="35643758"/>
+            <a:ext cx="15422878" cy="5963722"/>
           </a:xfrm>
           <a:prstGeom prst="rect">
             <a:avLst/>
@@ -2312,7 +2212,7 @@
                 <a:solidFill>
                   <a:schemeClr val="tx1"/>
                 </a:solidFill>
-                <a:hlinkClick r:id="rId3"/>
+                <a:hlinkClick r:id="rId2"/>
               </a:rPr>
               <a:t>https://repositorio.utfpr.edu.br/jspui/bitstream/1/30773/1/controleinteligentefuzzysemaforo.pdf</a:t>
             </a:r>
@@ -2355,7 +2255,7 @@
                 <a:solidFill>
                   <a:schemeClr val="tx1"/>
                 </a:solidFill>
-                <a:hlinkClick r:id="rId4"/>
+                <a:hlinkClick r:id="rId3"/>
               </a:rPr>
               <a:t>https://repositorio.ufsc.br/xmlui/bitstream/handle/123456789/82790/190526.pdf?sequence=1&amp;isAllowed=y</a:t>
             </a:r>
@@ -2402,7 +2302,7 @@
                 </a:solidFill>
                 <a:ea typeface="Calibri"/>
                 <a:cs typeface="Calibri"/>
-                <a:hlinkClick r:id="rId5"/>
+                <a:hlinkClick r:id="rId4"/>
               </a:rPr>
               <a:t>https://www.sba.org.br/open_journal_systems/index.php/sbai/article/view/2709/2249</a:t>
             </a:r>
@@ -2431,7 +2331,7 @@
           <p:nvPr/>
         </p:nvPicPr>
         <p:blipFill>
-          <a:blip r:embed="rId6"/>
+          <a:blip r:embed="rId5"/>
           <a:stretch>
             <a:fillRect/>
           </a:stretch>
@@ -2461,7 +2361,7 @@
           <p:nvPr/>
         </p:nvPicPr>
         <p:blipFill>
-          <a:blip r:embed="rId7"/>
+          <a:blip r:embed="rId6"/>
           <a:stretch>
             <a:fillRect/>
           </a:stretch>
@@ -2478,10 +2378,40 @@
       </p:pic>
       <p:pic>
         <p:nvPicPr>
-          <p:cNvPr id="8" name="Imagem 7">
+          <p:cNvPr id="6" name="Imagem 5" descr="Gráfico, Gráfico de linhas&#10;&#10;O conteúdo gerado por IA pode estar incorreto.">
             <a:extLst>
               <a:ext uri="{FF2B5EF4-FFF2-40B4-BE49-F238E27FC236}">
-                <a16:creationId xmlns:a16="http://schemas.microsoft.com/office/drawing/2014/main" id="{47EA2AF3-87B7-48A8-9F41-A772F18C6AD4}"/>
+                <a16:creationId xmlns:a16="http://schemas.microsoft.com/office/drawing/2014/main" id="{E224DFC3-68FC-0537-74E7-6CE8DE5D9D4F}"/>
+              </a:ext>
+            </a:extLst>
+          </p:cNvPr>
+          <p:cNvPicPr>
+            <a:picLocks noChangeAspect="1"/>
+          </p:cNvPicPr>
+          <p:nvPr/>
+        </p:nvPicPr>
+        <p:blipFill>
+          <a:blip r:embed="rId7"/>
+          <a:stretch>
+            <a:fillRect/>
+          </a:stretch>
+        </p:blipFill>
+        <p:spPr>
+          <a:xfrm>
+            <a:off x="16671277" y="13349049"/>
+            <a:ext cx="13000666" cy="10412687"/>
+          </a:xfrm>
+          <a:prstGeom prst="rect">
+            <a:avLst/>
+          </a:prstGeom>
+        </p:spPr>
+      </p:pic>
+      <p:pic>
+        <p:nvPicPr>
+          <p:cNvPr id="12" name="Imagem 11" descr="Gráfico&#10;&#10;O conteúdo gerado por IA pode estar incorreto.">
+            <a:extLst>
+              <a:ext uri="{FF2B5EF4-FFF2-40B4-BE49-F238E27FC236}">
+                <a16:creationId xmlns:a16="http://schemas.microsoft.com/office/drawing/2014/main" id="{2B3EEDB9-A71B-F054-4EDB-2A0DAFD8C4C0}"/>
               </a:ext>
             </a:extLst>
           </p:cNvPr>
@@ -2498,8 +2428,8 @@
         </p:blipFill>
         <p:spPr>
           <a:xfrm>
-            <a:off x="18434273" y="22375172"/>
-            <a:ext cx="9721080" cy="10161280"/>
+            <a:off x="16666515" y="24271083"/>
+            <a:ext cx="13070534" cy="10050631"/>
           </a:xfrm>
           <a:prstGeom prst="rect">
             <a:avLst/>
@@ -2508,10 +2438,10 @@
       </p:pic>
       <p:pic>
         <p:nvPicPr>
-          <p:cNvPr id="10" name="Imagem 9">
+          <p:cNvPr id="13" name="Imagem 12">
             <a:extLst>
               <a:ext uri="{FF2B5EF4-FFF2-40B4-BE49-F238E27FC236}">
-                <a16:creationId xmlns:a16="http://schemas.microsoft.com/office/drawing/2014/main" id="{4588763E-3995-49A8-AB35-37DF4E5044CE}"/>
+                <a16:creationId xmlns:a16="http://schemas.microsoft.com/office/drawing/2014/main" id="{3AEF1108-58D0-4E6F-AD2D-C412DF80ACF4}"/>
               </a:ext>
             </a:extLst>
           </p:cNvPr>
@@ -2528,7 +2458,7 @@
         </p:blipFill>
         <p:spPr>
           <a:xfrm>
-            <a:off x="12074520" y="32754048"/>
+            <a:off x="29238024" y="39380699"/>
             <a:ext cx="2514951" cy="3372321"/>
           </a:xfrm>
           <a:prstGeom prst="rect">

</xml_diff>